<commit_message>
Added more slides for 2021/08/02 meeting
</commit_message>
<xml_diff>
--- a/docs/MJBUnification20210720.pptx
+++ b/docs/MJBUnification20210720.pptx
@@ -13,6 +13,9 @@
     <p:sldId id="261" r:id="rId7"/>
     <p:sldId id="262" r:id="rId8"/>
     <p:sldId id="263" r:id="rId9"/>
+    <p:sldId id="264" r:id="rId10"/>
+    <p:sldId id="266" r:id="rId11"/>
+    <p:sldId id="265" r:id="rId12"/>
   </p:sldIdLst>
   <p:sldSz cx="9144000" cy="6858000" type="screen4x3"/>
   <p:notesSz cx="6858000" cy="9144000"/>
@@ -314,7 +317,7 @@
           <a:p>
             <a:fld id="{66DB5DB1-C2D9-4EE3-9A9C-38A3A17F68D3}" type="datetimeFigureOut">
               <a:rPr lang="en-US" smtClean="0"/>
-              <a:t>7/24/2021</a:t>
+              <a:t>8/1/2021</a:t>
             </a:fld>
             <a:endParaRPr lang="en-US"/>
           </a:p>
@@ -487,7 +490,7 @@
           <a:p>
             <a:fld id="{66DB5DB1-C2D9-4EE3-9A9C-38A3A17F68D3}" type="datetimeFigureOut">
               <a:rPr lang="en-US" smtClean="0"/>
-              <a:t>7/24/2021</a:t>
+              <a:t>8/1/2021</a:t>
             </a:fld>
             <a:endParaRPr lang="en-US"/>
           </a:p>
@@ -712,7 +715,7 @@
           <a:p>
             <a:fld id="{66DB5DB1-C2D9-4EE3-9A9C-38A3A17F68D3}" type="datetimeFigureOut">
               <a:rPr lang="en-US" smtClean="0"/>
-              <a:t>7/24/2021</a:t>
+              <a:t>8/1/2021</a:t>
             </a:fld>
             <a:endParaRPr lang="en-US"/>
           </a:p>
@@ -861,7 +864,7 @@
           <a:p>
             <a:fld id="{66DB5DB1-C2D9-4EE3-9A9C-38A3A17F68D3}" type="datetimeFigureOut">
               <a:rPr lang="en-US" smtClean="0"/>
-              <a:t>7/24/2021</a:t>
+              <a:t>8/1/2021</a:t>
             </a:fld>
             <a:endParaRPr lang="en-US"/>
           </a:p>
@@ -1332,7 +1335,7 @@
           <a:p>
             <a:fld id="{66DB5DB1-C2D9-4EE3-9A9C-38A3A17F68D3}" type="datetimeFigureOut">
               <a:rPr lang="en-US" smtClean="0"/>
-              <a:t>7/24/2021</a:t>
+              <a:t>8/1/2021</a:t>
             </a:fld>
             <a:endParaRPr lang="en-US"/>
           </a:p>
@@ -1496,7 +1499,7 @@
           <a:p>
             <a:fld id="{66DB5DB1-C2D9-4EE3-9A9C-38A3A17F68D3}" type="datetimeFigureOut">
               <a:rPr lang="en-US" smtClean="0"/>
-              <a:t>7/24/2021</a:t>
+              <a:t>8/1/2021</a:t>
             </a:fld>
             <a:endParaRPr lang="en-US"/>
           </a:p>
@@ -1968,7 +1971,7 @@
           <a:p>
             <a:fld id="{66DB5DB1-C2D9-4EE3-9A9C-38A3A17F68D3}" type="datetimeFigureOut">
               <a:rPr lang="en-US" smtClean="0"/>
-              <a:t>7/24/2021</a:t>
+              <a:t>8/1/2021</a:t>
             </a:fld>
             <a:endParaRPr lang="en-US"/>
           </a:p>
@@ -2089,7 +2092,7 @@
           <a:p>
             <a:fld id="{66DB5DB1-C2D9-4EE3-9A9C-38A3A17F68D3}" type="datetimeFigureOut">
               <a:rPr lang="en-US" smtClean="0"/>
-              <a:t>7/24/2021</a:t>
+              <a:t>8/1/2021</a:t>
             </a:fld>
             <a:endParaRPr lang="en-US"/>
           </a:p>
@@ -2187,7 +2190,7 @@
           <a:p>
             <a:fld id="{66DB5DB1-C2D9-4EE3-9A9C-38A3A17F68D3}" type="datetimeFigureOut">
               <a:rPr lang="en-US" smtClean="0"/>
-              <a:t>7/24/2021</a:t>
+              <a:t>8/1/2021</a:t>
             </a:fld>
             <a:endParaRPr lang="en-US"/>
           </a:p>
@@ -2483,7 +2486,7 @@
           <a:p>
             <a:fld id="{66DB5DB1-C2D9-4EE3-9A9C-38A3A17F68D3}" type="datetimeFigureOut">
               <a:rPr lang="en-US" smtClean="0"/>
-              <a:t>7/24/2021</a:t>
+              <a:t>8/1/2021</a:t>
             </a:fld>
             <a:endParaRPr lang="en-US"/>
           </a:p>
@@ -2718,7 +2721,7 @@
           <a:p>
             <a:fld id="{66DB5DB1-C2D9-4EE3-9A9C-38A3A17F68D3}" type="datetimeFigureOut">
               <a:rPr lang="en-US" smtClean="0"/>
-              <a:t>7/24/2021</a:t>
+              <a:t>8/1/2021</a:t>
             </a:fld>
             <a:endParaRPr lang="en-US"/>
           </a:p>
@@ -3190,7 +3193,7 @@
           <a:p>
             <a:fld id="{66DB5DB1-C2D9-4EE3-9A9C-38A3A17F68D3}" type="datetimeFigureOut">
               <a:rPr lang="en-US" smtClean="0"/>
-              <a:t>7/24/2021</a:t>
+              <a:t>8/1/2021</a:t>
             </a:fld>
             <a:endParaRPr lang="en-US"/>
           </a:p>
@@ -3585,6 +3588,2613 @@
 </p:sld>
 </file>
 
+<file path=ppt/slides/slide10.xml><?xml version="1.0" encoding="utf-8"?>
+<p:sld xmlns:a="http://schemas.openxmlformats.org/drawingml/2006/main" xmlns:r="http://schemas.openxmlformats.org/officeDocument/2006/relationships" xmlns:p="http://schemas.openxmlformats.org/presentationml/2006/main">
+  <p:cSld>
+    <p:spTree>
+      <p:nvGrpSpPr>
+        <p:cNvPr id="1" name=""/>
+        <p:cNvGrpSpPr/>
+        <p:nvPr/>
+      </p:nvGrpSpPr>
+      <p:grpSpPr>
+        <a:xfrm>
+          <a:off x="0" y="0"/>
+          <a:ext cx="0" cy="0"/>
+          <a:chOff x="0" y="0"/>
+          <a:chExt cx="0" cy="0"/>
+        </a:xfrm>
+      </p:grpSpPr>
+      <p:sp>
+        <p:nvSpPr>
+          <p:cNvPr id="4" name="Title 3"/>
+          <p:cNvSpPr>
+            <a:spLocks noGrp="1"/>
+          </p:cNvSpPr>
+          <p:nvPr>
+            <p:ph type="title"/>
+          </p:nvPr>
+        </p:nvSpPr>
+        <p:spPr/>
+        <p:txBody>
+          <a:bodyPr/>
+          <a:lstStyle/>
+          <a:p>
+            <a:r>
+              <a:rPr lang="en-US" dirty="0" smtClean="0"/>
+              <a:t>P2654 Node Structure</a:t>
+            </a:r>
+            <a:endParaRPr lang="en-US" dirty="0"/>
+          </a:p>
+        </p:txBody>
+      </p:sp>
+      <p:sp>
+        <p:nvSpPr>
+          <p:cNvPr id="5" name="Rectangle 4"/>
+          <p:cNvSpPr/>
+          <p:nvPr/>
+        </p:nvSpPr>
+        <p:spPr>
+          <a:xfrm>
+            <a:off x="2133600" y="2590800"/>
+            <a:ext cx="1219200" cy="914400"/>
+          </a:xfrm>
+          <a:prstGeom prst="rect">
+            <a:avLst/>
+          </a:prstGeom>
+        </p:spPr>
+        <p:style>
+          <a:lnRef idx="2">
+            <a:schemeClr val="accent1">
+              <a:shade val="50000"/>
+            </a:schemeClr>
+          </a:lnRef>
+          <a:fillRef idx="1">
+            <a:schemeClr val="accent1"/>
+          </a:fillRef>
+          <a:effectRef idx="0">
+            <a:schemeClr val="accent1"/>
+          </a:effectRef>
+          <a:fontRef idx="minor">
+            <a:schemeClr val="lt1"/>
+          </a:fontRef>
+        </p:style>
+        <p:txBody>
+          <a:bodyPr rtlCol="0" anchor="ctr"/>
+          <a:lstStyle/>
+          <a:p>
+            <a:pPr algn="ctr"/>
+            <a:r>
+              <a:rPr lang="en-US" dirty="0" smtClean="0"/>
+              <a:t>Insertion from Top</a:t>
+            </a:r>
+            <a:endParaRPr lang="en-US" dirty="0"/>
+          </a:p>
+        </p:txBody>
+      </p:sp>
+      <p:sp>
+        <p:nvSpPr>
+          <p:cNvPr id="6" name="Rectangle 5"/>
+          <p:cNvSpPr/>
+          <p:nvPr/>
+        </p:nvSpPr>
+        <p:spPr>
+          <a:xfrm>
+            <a:off x="2133600" y="3505200"/>
+            <a:ext cx="1219200" cy="914400"/>
+          </a:xfrm>
+          <a:prstGeom prst="rect">
+            <a:avLst/>
+          </a:prstGeom>
+          <a:solidFill>
+            <a:schemeClr val="accent3"/>
+          </a:solidFill>
+        </p:spPr>
+        <p:style>
+          <a:lnRef idx="2">
+            <a:schemeClr val="accent1">
+              <a:shade val="50000"/>
+            </a:schemeClr>
+          </a:lnRef>
+          <a:fillRef idx="1">
+            <a:schemeClr val="accent1"/>
+          </a:fillRef>
+          <a:effectRef idx="0">
+            <a:schemeClr val="accent1"/>
+          </a:effectRef>
+          <a:fontRef idx="minor">
+            <a:schemeClr val="lt1"/>
+          </a:fontRef>
+        </p:style>
+        <p:txBody>
+          <a:bodyPr rtlCol="0" anchor="ctr"/>
+          <a:lstStyle/>
+          <a:p>
+            <a:pPr algn="ctr"/>
+            <a:r>
+              <a:rPr lang="en-US" dirty="0" smtClean="0">
+                <a:solidFill>
+                  <a:schemeClr val="tx1"/>
+                </a:solidFill>
+              </a:rPr>
+              <a:t>Insertion from Bottom</a:t>
+            </a:r>
+            <a:endParaRPr lang="en-US" dirty="0">
+              <a:solidFill>
+                <a:schemeClr val="tx1"/>
+              </a:solidFill>
+            </a:endParaRPr>
+          </a:p>
+        </p:txBody>
+      </p:sp>
+      <p:sp>
+        <p:nvSpPr>
+          <p:cNvPr id="7" name="TextBox 6"/>
+          <p:cNvSpPr txBox="1"/>
+          <p:nvPr/>
+        </p:nvSpPr>
+        <p:spPr>
+          <a:xfrm>
+            <a:off x="2133600" y="2252246"/>
+            <a:ext cx="1447800" cy="338554"/>
+          </a:xfrm>
+          <a:prstGeom prst="rect">
+            <a:avLst/>
+          </a:prstGeom>
+          <a:noFill/>
+        </p:spPr>
+        <p:txBody>
+          <a:bodyPr wrap="square" rtlCol="0">
+            <a:spAutoFit/>
+          </a:bodyPr>
+          <a:lstStyle/>
+          <a:p>
+            <a:r>
+              <a:rPr lang="en-US" sz="1600" dirty="0" smtClean="0"/>
+              <a:t>P2654 Node</a:t>
+            </a:r>
+            <a:endParaRPr lang="en-US" sz="1600" dirty="0"/>
+          </a:p>
+        </p:txBody>
+      </p:sp>
+      <p:sp>
+        <p:nvSpPr>
+          <p:cNvPr id="8" name="Rectangle 7"/>
+          <p:cNvSpPr/>
+          <p:nvPr/>
+        </p:nvSpPr>
+        <p:spPr>
+          <a:xfrm>
+            <a:off x="5638800" y="2624554"/>
+            <a:ext cx="1219200" cy="914400"/>
+          </a:xfrm>
+          <a:prstGeom prst="rect">
+            <a:avLst/>
+          </a:prstGeom>
+        </p:spPr>
+        <p:style>
+          <a:lnRef idx="2">
+            <a:schemeClr val="accent1">
+              <a:shade val="50000"/>
+            </a:schemeClr>
+          </a:lnRef>
+          <a:fillRef idx="1">
+            <a:schemeClr val="accent1"/>
+          </a:fillRef>
+          <a:effectRef idx="0">
+            <a:schemeClr val="accent1"/>
+          </a:effectRef>
+          <a:fontRef idx="minor">
+            <a:schemeClr val="lt1"/>
+          </a:fontRef>
+        </p:style>
+        <p:txBody>
+          <a:bodyPr rtlCol="0" anchor="ctr"/>
+          <a:lstStyle/>
+          <a:p>
+            <a:pPr algn="ctr"/>
+            <a:r>
+              <a:rPr lang="en-US" dirty="0" smtClean="0"/>
+              <a:t>Insertion from Top</a:t>
+            </a:r>
+            <a:endParaRPr lang="en-US" dirty="0"/>
+          </a:p>
+        </p:txBody>
+      </p:sp>
+      <p:sp>
+        <p:nvSpPr>
+          <p:cNvPr id="9" name="Rectangle 8"/>
+          <p:cNvSpPr/>
+          <p:nvPr/>
+        </p:nvSpPr>
+        <p:spPr>
+          <a:xfrm>
+            <a:off x="5638800" y="3538954"/>
+            <a:ext cx="1219200" cy="914400"/>
+          </a:xfrm>
+          <a:prstGeom prst="rect">
+            <a:avLst/>
+          </a:prstGeom>
+          <a:solidFill>
+            <a:schemeClr val="accent3"/>
+          </a:solidFill>
+        </p:spPr>
+        <p:style>
+          <a:lnRef idx="2">
+            <a:schemeClr val="accent1">
+              <a:shade val="50000"/>
+            </a:schemeClr>
+          </a:lnRef>
+          <a:fillRef idx="1">
+            <a:schemeClr val="accent1"/>
+          </a:fillRef>
+          <a:effectRef idx="0">
+            <a:schemeClr val="accent1"/>
+          </a:effectRef>
+          <a:fontRef idx="minor">
+            <a:schemeClr val="lt1"/>
+          </a:fontRef>
+        </p:style>
+        <p:txBody>
+          <a:bodyPr rtlCol="0" anchor="ctr"/>
+          <a:lstStyle/>
+          <a:p>
+            <a:pPr algn="ctr"/>
+            <a:r>
+              <a:rPr lang="en-US" dirty="0" smtClean="0">
+                <a:solidFill>
+                  <a:schemeClr val="tx1"/>
+                </a:solidFill>
+              </a:rPr>
+              <a:t>Insertion from Bottom</a:t>
+            </a:r>
+            <a:endParaRPr lang="en-US" dirty="0">
+              <a:solidFill>
+                <a:schemeClr val="tx1"/>
+              </a:solidFill>
+            </a:endParaRPr>
+          </a:p>
+        </p:txBody>
+      </p:sp>
+      <p:sp>
+        <p:nvSpPr>
+          <p:cNvPr id="10" name="TextBox 9"/>
+          <p:cNvSpPr txBox="1"/>
+          <p:nvPr/>
+        </p:nvSpPr>
+        <p:spPr>
+          <a:xfrm>
+            <a:off x="5638800" y="2286000"/>
+            <a:ext cx="1447800" cy="338554"/>
+          </a:xfrm>
+          <a:prstGeom prst="rect">
+            <a:avLst/>
+          </a:prstGeom>
+          <a:noFill/>
+        </p:spPr>
+        <p:txBody>
+          <a:bodyPr wrap="square" rtlCol="0">
+            <a:spAutoFit/>
+          </a:bodyPr>
+          <a:lstStyle/>
+          <a:p>
+            <a:r>
+              <a:rPr lang="en-US" sz="1600" dirty="0" smtClean="0"/>
+              <a:t>P2654 Node</a:t>
+            </a:r>
+            <a:endParaRPr lang="en-US" sz="1600" dirty="0"/>
+          </a:p>
+        </p:txBody>
+      </p:sp>
+      <p:cxnSp>
+        <p:nvCxnSpPr>
+          <p:cNvPr id="12" name="Straight Arrow Connector 11"/>
+          <p:cNvCxnSpPr/>
+          <p:nvPr/>
+        </p:nvCxnSpPr>
+        <p:spPr>
+          <a:xfrm>
+            <a:off x="3352800" y="2743200"/>
+            <a:ext cx="2286000" cy="0"/>
+          </a:xfrm>
+          <a:prstGeom prst="straightConnector1">
+            <a:avLst/>
+          </a:prstGeom>
+          <a:ln w="38100">
+            <a:solidFill>
+              <a:schemeClr val="tx1"/>
+            </a:solidFill>
+            <a:headEnd type="none" w="med" len="med"/>
+            <a:tailEnd type="triangle" w="med" len="med"/>
+          </a:ln>
+        </p:spPr>
+        <p:style>
+          <a:lnRef idx="1">
+            <a:schemeClr val="accent1"/>
+          </a:lnRef>
+          <a:fillRef idx="0">
+            <a:schemeClr val="accent1"/>
+          </a:fillRef>
+          <a:effectRef idx="0">
+            <a:schemeClr val="accent1"/>
+          </a:effectRef>
+          <a:fontRef idx="minor">
+            <a:schemeClr val="tx1"/>
+          </a:fontRef>
+        </p:style>
+      </p:cxnSp>
+      <p:cxnSp>
+        <p:nvCxnSpPr>
+          <p:cNvPr id="13" name="Straight Arrow Connector 12"/>
+          <p:cNvCxnSpPr/>
+          <p:nvPr/>
+        </p:nvCxnSpPr>
+        <p:spPr>
+          <a:xfrm>
+            <a:off x="3352800" y="3276600"/>
+            <a:ext cx="2286000" cy="0"/>
+          </a:xfrm>
+          <a:prstGeom prst="straightConnector1">
+            <a:avLst/>
+          </a:prstGeom>
+          <a:ln w="38100">
+            <a:solidFill>
+              <a:schemeClr val="tx1"/>
+            </a:solidFill>
+            <a:headEnd type="triangle" w="med" len="med"/>
+            <a:tailEnd type="none" w="med" len="med"/>
+          </a:ln>
+        </p:spPr>
+        <p:style>
+          <a:lnRef idx="1">
+            <a:schemeClr val="accent1"/>
+          </a:lnRef>
+          <a:fillRef idx="0">
+            <a:schemeClr val="accent1"/>
+          </a:fillRef>
+          <a:effectRef idx="0">
+            <a:schemeClr val="accent1"/>
+          </a:effectRef>
+          <a:fontRef idx="minor">
+            <a:schemeClr val="tx1"/>
+          </a:fontRef>
+        </p:style>
+      </p:cxnSp>
+      <p:sp>
+        <p:nvSpPr>
+          <p:cNvPr id="14" name="TextBox 13"/>
+          <p:cNvSpPr txBox="1"/>
+          <p:nvPr/>
+        </p:nvSpPr>
+        <p:spPr>
+          <a:xfrm>
+            <a:off x="3562597" y="2481590"/>
+            <a:ext cx="1676400" cy="261610"/>
+          </a:xfrm>
+          <a:prstGeom prst="rect">
+            <a:avLst/>
+          </a:prstGeom>
+          <a:noFill/>
+        </p:spPr>
+        <p:txBody>
+          <a:bodyPr wrap="square" rtlCol="0">
+            <a:spAutoFit/>
+          </a:bodyPr>
+          <a:lstStyle/>
+          <a:p>
+            <a:r>
+              <a:rPr lang="en-US" sz="1100" dirty="0" err="1" smtClean="0"/>
+              <a:t>RVFCommand</a:t>
+            </a:r>
+            <a:r>
+              <a:rPr lang="en-US" sz="1100" dirty="0" smtClean="0"/>
+              <a:t> Request</a:t>
+            </a:r>
+            <a:endParaRPr lang="en-US" sz="1100" dirty="0"/>
+          </a:p>
+        </p:txBody>
+      </p:sp>
+      <p:sp>
+        <p:nvSpPr>
+          <p:cNvPr id="15" name="TextBox 14"/>
+          <p:cNvSpPr txBox="1"/>
+          <p:nvPr/>
+        </p:nvSpPr>
+        <p:spPr>
+          <a:xfrm>
+            <a:off x="3581400" y="3014990"/>
+            <a:ext cx="1828800" cy="261610"/>
+          </a:xfrm>
+          <a:prstGeom prst="rect">
+            <a:avLst/>
+          </a:prstGeom>
+          <a:noFill/>
+        </p:spPr>
+        <p:txBody>
+          <a:bodyPr wrap="square" rtlCol="0">
+            <a:spAutoFit/>
+          </a:bodyPr>
+          <a:lstStyle/>
+          <a:p>
+            <a:r>
+              <a:rPr lang="en-US" sz="1100" dirty="0" err="1" smtClean="0"/>
+              <a:t>RVFCommand</a:t>
+            </a:r>
+            <a:r>
+              <a:rPr lang="en-US" sz="1100" dirty="0" smtClean="0"/>
+              <a:t> Response</a:t>
+            </a:r>
+            <a:endParaRPr lang="en-US" sz="1100" dirty="0"/>
+          </a:p>
+        </p:txBody>
+      </p:sp>
+      <p:cxnSp>
+        <p:nvCxnSpPr>
+          <p:cNvPr id="16" name="Straight Arrow Connector 15"/>
+          <p:cNvCxnSpPr/>
+          <p:nvPr/>
+        </p:nvCxnSpPr>
+        <p:spPr>
+          <a:xfrm>
+            <a:off x="3352800" y="3733800"/>
+            <a:ext cx="2286000" cy="0"/>
+          </a:xfrm>
+          <a:prstGeom prst="straightConnector1">
+            <a:avLst/>
+          </a:prstGeom>
+          <a:ln w="38100">
+            <a:solidFill>
+              <a:schemeClr val="tx1"/>
+            </a:solidFill>
+            <a:headEnd type="triangle" w="med" len="med"/>
+            <a:tailEnd type="none" w="med" len="med"/>
+          </a:ln>
+        </p:spPr>
+        <p:style>
+          <a:lnRef idx="1">
+            <a:schemeClr val="accent1"/>
+          </a:lnRef>
+          <a:fillRef idx="0">
+            <a:schemeClr val="accent1"/>
+          </a:fillRef>
+          <a:effectRef idx="0">
+            <a:schemeClr val="accent1"/>
+          </a:effectRef>
+          <a:fontRef idx="minor">
+            <a:schemeClr val="tx1"/>
+          </a:fontRef>
+        </p:style>
+      </p:cxnSp>
+      <p:cxnSp>
+        <p:nvCxnSpPr>
+          <p:cNvPr id="17" name="Straight Arrow Connector 16"/>
+          <p:cNvCxnSpPr/>
+          <p:nvPr/>
+        </p:nvCxnSpPr>
+        <p:spPr>
+          <a:xfrm>
+            <a:off x="3352800" y="4267200"/>
+            <a:ext cx="2286000" cy="0"/>
+          </a:xfrm>
+          <a:prstGeom prst="straightConnector1">
+            <a:avLst/>
+          </a:prstGeom>
+          <a:ln w="38100">
+            <a:solidFill>
+              <a:schemeClr val="tx1"/>
+            </a:solidFill>
+            <a:headEnd type="none" w="med" len="med"/>
+            <a:tailEnd type="triangle" w="med" len="med"/>
+          </a:ln>
+        </p:spPr>
+        <p:style>
+          <a:lnRef idx="1">
+            <a:schemeClr val="accent1"/>
+          </a:lnRef>
+          <a:fillRef idx="0">
+            <a:schemeClr val="accent1"/>
+          </a:fillRef>
+          <a:effectRef idx="0">
+            <a:schemeClr val="accent1"/>
+          </a:effectRef>
+          <a:fontRef idx="minor">
+            <a:schemeClr val="tx1"/>
+          </a:fontRef>
+        </p:style>
+      </p:cxnSp>
+      <p:sp>
+        <p:nvSpPr>
+          <p:cNvPr id="18" name="TextBox 17"/>
+          <p:cNvSpPr txBox="1"/>
+          <p:nvPr/>
+        </p:nvSpPr>
+        <p:spPr>
+          <a:xfrm>
+            <a:off x="3562597" y="3472190"/>
+            <a:ext cx="1676400" cy="261610"/>
+          </a:xfrm>
+          <a:prstGeom prst="rect">
+            <a:avLst/>
+          </a:prstGeom>
+          <a:noFill/>
+        </p:spPr>
+        <p:txBody>
+          <a:bodyPr wrap="square" rtlCol="0">
+            <a:spAutoFit/>
+          </a:bodyPr>
+          <a:lstStyle/>
+          <a:p>
+            <a:r>
+              <a:rPr lang="en-US" sz="1100" dirty="0" err="1" smtClean="0"/>
+              <a:t>RVFMessage</a:t>
+            </a:r>
+            <a:r>
+              <a:rPr lang="en-US" sz="1100" dirty="0" smtClean="0"/>
+              <a:t> Request</a:t>
+            </a:r>
+            <a:endParaRPr lang="en-US" sz="1100" dirty="0"/>
+          </a:p>
+        </p:txBody>
+      </p:sp>
+      <p:sp>
+        <p:nvSpPr>
+          <p:cNvPr id="19" name="TextBox 18"/>
+          <p:cNvSpPr txBox="1"/>
+          <p:nvPr/>
+        </p:nvSpPr>
+        <p:spPr>
+          <a:xfrm>
+            <a:off x="3581400" y="4005590"/>
+            <a:ext cx="1828800" cy="261610"/>
+          </a:xfrm>
+          <a:prstGeom prst="rect">
+            <a:avLst/>
+          </a:prstGeom>
+          <a:noFill/>
+        </p:spPr>
+        <p:txBody>
+          <a:bodyPr wrap="square" rtlCol="0">
+            <a:spAutoFit/>
+          </a:bodyPr>
+          <a:lstStyle/>
+          <a:p>
+            <a:r>
+              <a:rPr lang="en-US" sz="1100" dirty="0" err="1" smtClean="0"/>
+              <a:t>RVFMessage</a:t>
+            </a:r>
+            <a:r>
+              <a:rPr lang="en-US" sz="1100" dirty="0" smtClean="0"/>
+              <a:t> Response</a:t>
+            </a:r>
+            <a:endParaRPr lang="en-US" sz="1100" dirty="0"/>
+          </a:p>
+        </p:txBody>
+      </p:sp>
+      <p:cxnSp>
+        <p:nvCxnSpPr>
+          <p:cNvPr id="20" name="Straight Arrow Connector 19"/>
+          <p:cNvCxnSpPr/>
+          <p:nvPr/>
+        </p:nvCxnSpPr>
+        <p:spPr>
+          <a:xfrm>
+            <a:off x="76200" y="2743200"/>
+            <a:ext cx="2057400" cy="0"/>
+          </a:xfrm>
+          <a:prstGeom prst="straightConnector1">
+            <a:avLst/>
+          </a:prstGeom>
+          <a:ln w="38100">
+            <a:solidFill>
+              <a:schemeClr val="tx1"/>
+            </a:solidFill>
+            <a:headEnd type="none" w="med" len="med"/>
+            <a:tailEnd type="triangle" w="med" len="med"/>
+          </a:ln>
+        </p:spPr>
+        <p:style>
+          <a:lnRef idx="1">
+            <a:schemeClr val="accent1"/>
+          </a:lnRef>
+          <a:fillRef idx="0">
+            <a:schemeClr val="accent1"/>
+          </a:fillRef>
+          <a:effectRef idx="0">
+            <a:schemeClr val="accent1"/>
+          </a:effectRef>
+          <a:fontRef idx="minor">
+            <a:schemeClr val="tx1"/>
+          </a:fontRef>
+        </p:style>
+      </p:cxnSp>
+      <p:cxnSp>
+        <p:nvCxnSpPr>
+          <p:cNvPr id="21" name="Straight Arrow Connector 20"/>
+          <p:cNvCxnSpPr/>
+          <p:nvPr/>
+        </p:nvCxnSpPr>
+        <p:spPr>
+          <a:xfrm>
+            <a:off x="57397" y="3276600"/>
+            <a:ext cx="2076203" cy="0"/>
+          </a:xfrm>
+          <a:prstGeom prst="straightConnector1">
+            <a:avLst/>
+          </a:prstGeom>
+          <a:ln w="38100">
+            <a:solidFill>
+              <a:schemeClr val="tx1"/>
+            </a:solidFill>
+            <a:headEnd type="triangle" w="med" len="med"/>
+            <a:tailEnd type="none" w="med" len="med"/>
+          </a:ln>
+        </p:spPr>
+        <p:style>
+          <a:lnRef idx="1">
+            <a:schemeClr val="accent1"/>
+          </a:lnRef>
+          <a:fillRef idx="0">
+            <a:schemeClr val="accent1"/>
+          </a:fillRef>
+          <a:effectRef idx="0">
+            <a:schemeClr val="accent1"/>
+          </a:effectRef>
+          <a:fontRef idx="minor">
+            <a:schemeClr val="tx1"/>
+          </a:fontRef>
+        </p:style>
+      </p:cxnSp>
+      <p:sp>
+        <p:nvSpPr>
+          <p:cNvPr id="22" name="TextBox 21"/>
+          <p:cNvSpPr txBox="1"/>
+          <p:nvPr/>
+        </p:nvSpPr>
+        <p:spPr>
+          <a:xfrm>
+            <a:off x="57397" y="2481590"/>
+            <a:ext cx="1676400" cy="261610"/>
+          </a:xfrm>
+          <a:prstGeom prst="rect">
+            <a:avLst/>
+          </a:prstGeom>
+          <a:noFill/>
+        </p:spPr>
+        <p:txBody>
+          <a:bodyPr wrap="square" rtlCol="0">
+            <a:spAutoFit/>
+          </a:bodyPr>
+          <a:lstStyle/>
+          <a:p>
+            <a:r>
+              <a:rPr lang="en-US" sz="1100" dirty="0" err="1" smtClean="0"/>
+              <a:t>RVFCommand</a:t>
+            </a:r>
+            <a:r>
+              <a:rPr lang="en-US" sz="1100" dirty="0" smtClean="0"/>
+              <a:t> Request</a:t>
+            </a:r>
+            <a:endParaRPr lang="en-US" sz="1100" dirty="0"/>
+          </a:p>
+        </p:txBody>
+      </p:sp>
+      <p:sp>
+        <p:nvSpPr>
+          <p:cNvPr id="23" name="TextBox 22"/>
+          <p:cNvSpPr txBox="1"/>
+          <p:nvPr/>
+        </p:nvSpPr>
+        <p:spPr>
+          <a:xfrm>
+            <a:off x="76200" y="3014990"/>
+            <a:ext cx="1828800" cy="261610"/>
+          </a:xfrm>
+          <a:prstGeom prst="rect">
+            <a:avLst/>
+          </a:prstGeom>
+          <a:noFill/>
+        </p:spPr>
+        <p:txBody>
+          <a:bodyPr wrap="square" rtlCol="0">
+            <a:spAutoFit/>
+          </a:bodyPr>
+          <a:lstStyle/>
+          <a:p>
+            <a:r>
+              <a:rPr lang="en-US" sz="1100" dirty="0" err="1" smtClean="0"/>
+              <a:t>RVFCommand</a:t>
+            </a:r>
+            <a:r>
+              <a:rPr lang="en-US" sz="1100" dirty="0" smtClean="0"/>
+              <a:t> Response</a:t>
+            </a:r>
+            <a:endParaRPr lang="en-US" sz="1100" dirty="0"/>
+          </a:p>
+        </p:txBody>
+      </p:sp>
+      <p:cxnSp>
+        <p:nvCxnSpPr>
+          <p:cNvPr id="24" name="Straight Arrow Connector 23"/>
+          <p:cNvCxnSpPr/>
+          <p:nvPr/>
+        </p:nvCxnSpPr>
+        <p:spPr>
+          <a:xfrm>
+            <a:off x="76200" y="3733800"/>
+            <a:ext cx="2057400" cy="0"/>
+          </a:xfrm>
+          <a:prstGeom prst="straightConnector1">
+            <a:avLst/>
+          </a:prstGeom>
+          <a:ln w="38100">
+            <a:solidFill>
+              <a:schemeClr val="tx1"/>
+            </a:solidFill>
+            <a:headEnd type="triangle" w="med" len="med"/>
+            <a:tailEnd type="none" w="med" len="med"/>
+          </a:ln>
+        </p:spPr>
+        <p:style>
+          <a:lnRef idx="1">
+            <a:schemeClr val="accent1"/>
+          </a:lnRef>
+          <a:fillRef idx="0">
+            <a:schemeClr val="accent1"/>
+          </a:fillRef>
+          <a:effectRef idx="0">
+            <a:schemeClr val="accent1"/>
+          </a:effectRef>
+          <a:fontRef idx="minor">
+            <a:schemeClr val="tx1"/>
+          </a:fontRef>
+        </p:style>
+      </p:cxnSp>
+      <p:cxnSp>
+        <p:nvCxnSpPr>
+          <p:cNvPr id="25" name="Straight Arrow Connector 24"/>
+          <p:cNvCxnSpPr/>
+          <p:nvPr/>
+        </p:nvCxnSpPr>
+        <p:spPr>
+          <a:xfrm>
+            <a:off x="76200" y="4267200"/>
+            <a:ext cx="2057400" cy="0"/>
+          </a:xfrm>
+          <a:prstGeom prst="straightConnector1">
+            <a:avLst/>
+          </a:prstGeom>
+          <a:ln w="38100">
+            <a:solidFill>
+              <a:schemeClr val="tx1"/>
+            </a:solidFill>
+            <a:headEnd type="none" w="med" len="med"/>
+            <a:tailEnd type="triangle" w="med" len="med"/>
+          </a:ln>
+        </p:spPr>
+        <p:style>
+          <a:lnRef idx="1">
+            <a:schemeClr val="accent1"/>
+          </a:lnRef>
+          <a:fillRef idx="0">
+            <a:schemeClr val="accent1"/>
+          </a:fillRef>
+          <a:effectRef idx="0">
+            <a:schemeClr val="accent1"/>
+          </a:effectRef>
+          <a:fontRef idx="minor">
+            <a:schemeClr val="tx1"/>
+          </a:fontRef>
+        </p:style>
+      </p:cxnSp>
+      <p:sp>
+        <p:nvSpPr>
+          <p:cNvPr id="26" name="TextBox 25"/>
+          <p:cNvSpPr txBox="1"/>
+          <p:nvPr/>
+        </p:nvSpPr>
+        <p:spPr>
+          <a:xfrm>
+            <a:off x="57397" y="3472190"/>
+            <a:ext cx="1676400" cy="261610"/>
+          </a:xfrm>
+          <a:prstGeom prst="rect">
+            <a:avLst/>
+          </a:prstGeom>
+          <a:noFill/>
+        </p:spPr>
+        <p:txBody>
+          <a:bodyPr wrap="square" rtlCol="0">
+            <a:spAutoFit/>
+          </a:bodyPr>
+          <a:lstStyle/>
+          <a:p>
+            <a:r>
+              <a:rPr lang="en-US" sz="1100" dirty="0" err="1" smtClean="0"/>
+              <a:t>RVFMessage</a:t>
+            </a:r>
+            <a:r>
+              <a:rPr lang="en-US" sz="1100" dirty="0" smtClean="0"/>
+              <a:t> Request</a:t>
+            </a:r>
+            <a:endParaRPr lang="en-US" sz="1100" dirty="0"/>
+          </a:p>
+        </p:txBody>
+      </p:sp>
+      <p:sp>
+        <p:nvSpPr>
+          <p:cNvPr id="27" name="TextBox 26"/>
+          <p:cNvSpPr txBox="1"/>
+          <p:nvPr/>
+        </p:nvSpPr>
+        <p:spPr>
+          <a:xfrm>
+            <a:off x="76200" y="4005590"/>
+            <a:ext cx="1828800" cy="261610"/>
+          </a:xfrm>
+          <a:prstGeom prst="rect">
+            <a:avLst/>
+          </a:prstGeom>
+          <a:noFill/>
+        </p:spPr>
+        <p:txBody>
+          <a:bodyPr wrap="square" rtlCol="0">
+            <a:spAutoFit/>
+          </a:bodyPr>
+          <a:lstStyle/>
+          <a:p>
+            <a:r>
+              <a:rPr lang="en-US" sz="1100" dirty="0" err="1" smtClean="0"/>
+              <a:t>RVFMessage</a:t>
+            </a:r>
+            <a:r>
+              <a:rPr lang="en-US" sz="1100" dirty="0" smtClean="0"/>
+              <a:t> Response</a:t>
+            </a:r>
+            <a:endParaRPr lang="en-US" sz="1100" dirty="0"/>
+          </a:p>
+        </p:txBody>
+      </p:sp>
+      <p:cxnSp>
+        <p:nvCxnSpPr>
+          <p:cNvPr id="28" name="Straight Arrow Connector 27"/>
+          <p:cNvCxnSpPr/>
+          <p:nvPr/>
+        </p:nvCxnSpPr>
+        <p:spPr>
+          <a:xfrm>
+            <a:off x="6858000" y="2743200"/>
+            <a:ext cx="2286000" cy="0"/>
+          </a:xfrm>
+          <a:prstGeom prst="straightConnector1">
+            <a:avLst/>
+          </a:prstGeom>
+          <a:ln w="38100">
+            <a:solidFill>
+              <a:schemeClr val="tx1"/>
+            </a:solidFill>
+            <a:headEnd type="none" w="med" len="med"/>
+            <a:tailEnd type="triangle" w="med" len="med"/>
+          </a:ln>
+        </p:spPr>
+        <p:style>
+          <a:lnRef idx="1">
+            <a:schemeClr val="accent1"/>
+          </a:lnRef>
+          <a:fillRef idx="0">
+            <a:schemeClr val="accent1"/>
+          </a:fillRef>
+          <a:effectRef idx="0">
+            <a:schemeClr val="accent1"/>
+          </a:effectRef>
+          <a:fontRef idx="minor">
+            <a:schemeClr val="tx1"/>
+          </a:fontRef>
+        </p:style>
+      </p:cxnSp>
+      <p:cxnSp>
+        <p:nvCxnSpPr>
+          <p:cNvPr id="29" name="Straight Arrow Connector 28"/>
+          <p:cNvCxnSpPr/>
+          <p:nvPr/>
+        </p:nvCxnSpPr>
+        <p:spPr>
+          <a:xfrm>
+            <a:off x="6858000" y="3276600"/>
+            <a:ext cx="2286000" cy="0"/>
+          </a:xfrm>
+          <a:prstGeom prst="straightConnector1">
+            <a:avLst/>
+          </a:prstGeom>
+          <a:ln w="38100">
+            <a:solidFill>
+              <a:schemeClr val="tx1"/>
+            </a:solidFill>
+            <a:headEnd type="triangle" w="med" len="med"/>
+            <a:tailEnd type="none" w="med" len="med"/>
+          </a:ln>
+        </p:spPr>
+        <p:style>
+          <a:lnRef idx="1">
+            <a:schemeClr val="accent1"/>
+          </a:lnRef>
+          <a:fillRef idx="0">
+            <a:schemeClr val="accent1"/>
+          </a:fillRef>
+          <a:effectRef idx="0">
+            <a:schemeClr val="accent1"/>
+          </a:effectRef>
+          <a:fontRef idx="minor">
+            <a:schemeClr val="tx1"/>
+          </a:fontRef>
+        </p:style>
+      </p:cxnSp>
+      <p:sp>
+        <p:nvSpPr>
+          <p:cNvPr id="30" name="TextBox 29"/>
+          <p:cNvSpPr txBox="1"/>
+          <p:nvPr/>
+        </p:nvSpPr>
+        <p:spPr>
+          <a:xfrm>
+            <a:off x="7067797" y="2481590"/>
+            <a:ext cx="1676400" cy="261610"/>
+          </a:xfrm>
+          <a:prstGeom prst="rect">
+            <a:avLst/>
+          </a:prstGeom>
+          <a:noFill/>
+        </p:spPr>
+        <p:txBody>
+          <a:bodyPr wrap="square" rtlCol="0">
+            <a:spAutoFit/>
+          </a:bodyPr>
+          <a:lstStyle/>
+          <a:p>
+            <a:r>
+              <a:rPr lang="en-US" sz="1100" dirty="0" err="1" smtClean="0"/>
+              <a:t>RVFCommand</a:t>
+            </a:r>
+            <a:r>
+              <a:rPr lang="en-US" sz="1100" dirty="0" smtClean="0"/>
+              <a:t> Request</a:t>
+            </a:r>
+            <a:endParaRPr lang="en-US" sz="1100" dirty="0"/>
+          </a:p>
+        </p:txBody>
+      </p:sp>
+      <p:sp>
+        <p:nvSpPr>
+          <p:cNvPr id="31" name="TextBox 30"/>
+          <p:cNvSpPr txBox="1"/>
+          <p:nvPr/>
+        </p:nvSpPr>
+        <p:spPr>
+          <a:xfrm>
+            <a:off x="7086600" y="3014990"/>
+            <a:ext cx="1828800" cy="261610"/>
+          </a:xfrm>
+          <a:prstGeom prst="rect">
+            <a:avLst/>
+          </a:prstGeom>
+          <a:noFill/>
+        </p:spPr>
+        <p:txBody>
+          <a:bodyPr wrap="square" rtlCol="0">
+            <a:spAutoFit/>
+          </a:bodyPr>
+          <a:lstStyle/>
+          <a:p>
+            <a:r>
+              <a:rPr lang="en-US" sz="1100" dirty="0" err="1" smtClean="0"/>
+              <a:t>RVFCommand</a:t>
+            </a:r>
+            <a:r>
+              <a:rPr lang="en-US" sz="1100" dirty="0" smtClean="0"/>
+              <a:t> Response</a:t>
+            </a:r>
+            <a:endParaRPr lang="en-US" sz="1100" dirty="0"/>
+          </a:p>
+        </p:txBody>
+      </p:sp>
+      <p:cxnSp>
+        <p:nvCxnSpPr>
+          <p:cNvPr id="32" name="Straight Arrow Connector 31"/>
+          <p:cNvCxnSpPr/>
+          <p:nvPr/>
+        </p:nvCxnSpPr>
+        <p:spPr>
+          <a:xfrm>
+            <a:off x="6858000" y="3733800"/>
+            <a:ext cx="2286000" cy="0"/>
+          </a:xfrm>
+          <a:prstGeom prst="straightConnector1">
+            <a:avLst/>
+          </a:prstGeom>
+          <a:ln w="38100">
+            <a:solidFill>
+              <a:schemeClr val="tx1"/>
+            </a:solidFill>
+            <a:headEnd type="triangle" w="med" len="med"/>
+            <a:tailEnd type="none" w="med" len="med"/>
+          </a:ln>
+        </p:spPr>
+        <p:style>
+          <a:lnRef idx="1">
+            <a:schemeClr val="accent1"/>
+          </a:lnRef>
+          <a:fillRef idx="0">
+            <a:schemeClr val="accent1"/>
+          </a:fillRef>
+          <a:effectRef idx="0">
+            <a:schemeClr val="accent1"/>
+          </a:effectRef>
+          <a:fontRef idx="minor">
+            <a:schemeClr val="tx1"/>
+          </a:fontRef>
+        </p:style>
+      </p:cxnSp>
+      <p:cxnSp>
+        <p:nvCxnSpPr>
+          <p:cNvPr id="33" name="Straight Arrow Connector 32"/>
+          <p:cNvCxnSpPr/>
+          <p:nvPr/>
+        </p:nvCxnSpPr>
+        <p:spPr>
+          <a:xfrm>
+            <a:off x="6858000" y="4267200"/>
+            <a:ext cx="2286000" cy="0"/>
+          </a:xfrm>
+          <a:prstGeom prst="straightConnector1">
+            <a:avLst/>
+          </a:prstGeom>
+          <a:ln w="38100">
+            <a:solidFill>
+              <a:schemeClr val="tx1"/>
+            </a:solidFill>
+            <a:headEnd type="none" w="med" len="med"/>
+            <a:tailEnd type="triangle" w="med" len="med"/>
+          </a:ln>
+        </p:spPr>
+        <p:style>
+          <a:lnRef idx="1">
+            <a:schemeClr val="accent1"/>
+          </a:lnRef>
+          <a:fillRef idx="0">
+            <a:schemeClr val="accent1"/>
+          </a:fillRef>
+          <a:effectRef idx="0">
+            <a:schemeClr val="accent1"/>
+          </a:effectRef>
+          <a:fontRef idx="minor">
+            <a:schemeClr val="tx1"/>
+          </a:fontRef>
+        </p:style>
+      </p:cxnSp>
+      <p:sp>
+        <p:nvSpPr>
+          <p:cNvPr id="34" name="TextBox 33"/>
+          <p:cNvSpPr txBox="1"/>
+          <p:nvPr/>
+        </p:nvSpPr>
+        <p:spPr>
+          <a:xfrm>
+            <a:off x="7067797" y="3472190"/>
+            <a:ext cx="1676400" cy="261610"/>
+          </a:xfrm>
+          <a:prstGeom prst="rect">
+            <a:avLst/>
+          </a:prstGeom>
+          <a:noFill/>
+        </p:spPr>
+        <p:txBody>
+          <a:bodyPr wrap="square" rtlCol="0">
+            <a:spAutoFit/>
+          </a:bodyPr>
+          <a:lstStyle/>
+          <a:p>
+            <a:r>
+              <a:rPr lang="en-US" sz="1100" dirty="0" err="1" smtClean="0"/>
+              <a:t>RVFMessage</a:t>
+            </a:r>
+            <a:r>
+              <a:rPr lang="en-US" sz="1100" dirty="0" smtClean="0"/>
+              <a:t> Request</a:t>
+            </a:r>
+            <a:endParaRPr lang="en-US" sz="1100" dirty="0"/>
+          </a:p>
+        </p:txBody>
+      </p:sp>
+      <p:sp>
+        <p:nvSpPr>
+          <p:cNvPr id="35" name="TextBox 34"/>
+          <p:cNvSpPr txBox="1"/>
+          <p:nvPr/>
+        </p:nvSpPr>
+        <p:spPr>
+          <a:xfrm>
+            <a:off x="7086600" y="4005590"/>
+            <a:ext cx="1828800" cy="261610"/>
+          </a:xfrm>
+          <a:prstGeom prst="rect">
+            <a:avLst/>
+          </a:prstGeom>
+          <a:noFill/>
+        </p:spPr>
+        <p:txBody>
+          <a:bodyPr wrap="square" rtlCol="0">
+            <a:spAutoFit/>
+          </a:bodyPr>
+          <a:lstStyle/>
+          <a:p>
+            <a:r>
+              <a:rPr lang="en-US" sz="1100" dirty="0" err="1" smtClean="0"/>
+              <a:t>RVFMessage</a:t>
+            </a:r>
+            <a:r>
+              <a:rPr lang="en-US" sz="1100" dirty="0" smtClean="0"/>
+              <a:t> Response</a:t>
+            </a:r>
+            <a:endParaRPr lang="en-US" sz="1100" dirty="0"/>
+          </a:p>
+        </p:txBody>
+      </p:sp>
+    </p:spTree>
+    <p:extLst>
+      <p:ext uri="{BB962C8B-B14F-4D97-AF65-F5344CB8AC3E}">
+        <p14:creationId xmlns:p14="http://schemas.microsoft.com/office/powerpoint/2010/main" val="2638764455"/>
+      </p:ext>
+    </p:extLst>
+  </p:cSld>
+  <p:clrMapOvr>
+    <a:masterClrMapping/>
+  </p:clrMapOvr>
+</p:sld>
+</file>
+
+<file path=ppt/slides/slide11.xml><?xml version="1.0" encoding="utf-8"?>
+<p:sld xmlns:a="http://schemas.openxmlformats.org/drawingml/2006/main" xmlns:r="http://schemas.openxmlformats.org/officeDocument/2006/relationships" xmlns:p="http://schemas.openxmlformats.org/presentationml/2006/main">
+  <p:cSld>
+    <p:spTree>
+      <p:nvGrpSpPr>
+        <p:cNvPr id="1" name=""/>
+        <p:cNvGrpSpPr/>
+        <p:nvPr/>
+      </p:nvGrpSpPr>
+      <p:grpSpPr>
+        <a:xfrm>
+          <a:off x="0" y="0"/>
+          <a:ext cx="0" cy="0"/>
+          <a:chOff x="0" y="0"/>
+          <a:chExt cx="0" cy="0"/>
+        </a:xfrm>
+      </p:grpSpPr>
+      <p:sp>
+        <p:nvSpPr>
+          <p:cNvPr id="4" name="Title 3"/>
+          <p:cNvSpPr>
+            <a:spLocks noGrp="1"/>
+          </p:cNvSpPr>
+          <p:nvPr>
+            <p:ph type="title"/>
+          </p:nvPr>
+        </p:nvSpPr>
+        <p:spPr/>
+        <p:txBody>
+          <a:bodyPr/>
+          <a:lstStyle/>
+          <a:p>
+            <a:r>
+              <a:rPr lang="en-US" dirty="0" smtClean="0"/>
+              <a:t>Top-Down to Bottom-Up Flow</a:t>
+            </a:r>
+            <a:endParaRPr lang="en-US" dirty="0"/>
+          </a:p>
+        </p:txBody>
+      </p:sp>
+      <p:sp>
+        <p:nvSpPr>
+          <p:cNvPr id="6" name="Flowchart: Alternate Process 5"/>
+          <p:cNvSpPr/>
+          <p:nvPr/>
+        </p:nvSpPr>
+        <p:spPr>
+          <a:xfrm>
+            <a:off x="509650" y="1752600"/>
+            <a:ext cx="1447800" cy="838200"/>
+          </a:xfrm>
+          <a:prstGeom prst="flowChartAlternateProcess">
+            <a:avLst/>
+          </a:prstGeom>
+        </p:spPr>
+        <p:style>
+          <a:lnRef idx="2">
+            <a:schemeClr val="accent1">
+              <a:shade val="50000"/>
+            </a:schemeClr>
+          </a:lnRef>
+          <a:fillRef idx="1">
+            <a:schemeClr val="accent1"/>
+          </a:fillRef>
+          <a:effectRef idx="0">
+            <a:schemeClr val="accent1"/>
+          </a:effectRef>
+          <a:fontRef idx="minor">
+            <a:schemeClr val="lt1"/>
+          </a:fontRef>
+        </p:style>
+        <p:txBody>
+          <a:bodyPr rtlCol="0" anchor="ctr"/>
+          <a:lstStyle/>
+          <a:p>
+            <a:pPr algn="ctr"/>
+            <a:r>
+              <a:rPr lang="en-US" sz="1400" dirty="0" smtClean="0"/>
+              <a:t>P2654 </a:t>
+            </a:r>
+            <a:r>
+              <a:rPr lang="en-US" sz="1400" dirty="0" err="1" smtClean="0"/>
+              <a:t>RVFCommand</a:t>
+            </a:r>
+            <a:r>
+              <a:rPr lang="en-US" sz="1400" dirty="0" smtClean="0"/>
+              <a:t> Sent from Application</a:t>
+            </a:r>
+            <a:endParaRPr lang="en-US" sz="1400" dirty="0"/>
+          </a:p>
+        </p:txBody>
+      </p:sp>
+      <p:sp>
+        <p:nvSpPr>
+          <p:cNvPr id="7" name="Flowchart: Decision 6"/>
+          <p:cNvSpPr/>
+          <p:nvPr/>
+        </p:nvSpPr>
+        <p:spPr>
+          <a:xfrm>
+            <a:off x="0" y="3048000"/>
+            <a:ext cx="2438400" cy="990600"/>
+          </a:xfrm>
+          <a:prstGeom prst="flowChartDecision">
+            <a:avLst/>
+          </a:prstGeom>
+          <a:solidFill>
+            <a:schemeClr val="accent3"/>
+          </a:solidFill>
+          <a:ln>
+            <a:solidFill>
+              <a:schemeClr val="tx1"/>
+            </a:solidFill>
+          </a:ln>
+        </p:spPr>
+        <p:style>
+          <a:lnRef idx="2">
+            <a:schemeClr val="accent1">
+              <a:shade val="50000"/>
+            </a:schemeClr>
+          </a:lnRef>
+          <a:fillRef idx="1">
+            <a:schemeClr val="accent1"/>
+          </a:fillRef>
+          <a:effectRef idx="0">
+            <a:schemeClr val="accent1"/>
+          </a:effectRef>
+          <a:fontRef idx="minor">
+            <a:schemeClr val="lt1"/>
+          </a:fontRef>
+        </p:style>
+        <p:txBody>
+          <a:bodyPr rtlCol="0" anchor="ctr"/>
+          <a:lstStyle/>
+          <a:p>
+            <a:pPr algn="ctr"/>
+            <a:r>
+              <a:rPr lang="en-US" sz="1200" dirty="0" smtClean="0">
+                <a:solidFill>
+                  <a:schemeClr val="tx1"/>
+                </a:solidFill>
+              </a:rPr>
+              <a:t>Is Node target of </a:t>
+            </a:r>
+            <a:r>
+              <a:rPr lang="en-US" sz="1200" dirty="0" err="1" smtClean="0">
+                <a:solidFill>
+                  <a:schemeClr val="tx1"/>
+                </a:solidFill>
+              </a:rPr>
+              <a:t>RVFCommand</a:t>
+            </a:r>
+            <a:endParaRPr lang="en-US" sz="1200" dirty="0" smtClean="0">
+              <a:solidFill>
+                <a:schemeClr val="tx1"/>
+              </a:solidFill>
+            </a:endParaRPr>
+          </a:p>
+          <a:p>
+            <a:pPr algn="ctr"/>
+            <a:r>
+              <a:rPr lang="en-US" sz="1200" dirty="0" smtClean="0">
+                <a:solidFill>
+                  <a:schemeClr val="tx1"/>
+                </a:solidFill>
+              </a:rPr>
+              <a:t>?</a:t>
+            </a:r>
+          </a:p>
+        </p:txBody>
+      </p:sp>
+      <p:cxnSp>
+        <p:nvCxnSpPr>
+          <p:cNvPr id="9" name="Straight Arrow Connector 8"/>
+          <p:cNvCxnSpPr>
+            <a:stCxn id="6" idx="2"/>
+            <a:endCxn id="7" idx="0"/>
+          </p:cNvCxnSpPr>
+          <p:nvPr/>
+        </p:nvCxnSpPr>
+        <p:spPr>
+          <a:xfrm flipH="1">
+            <a:off x="1219200" y="2590800"/>
+            <a:ext cx="14350" cy="457200"/>
+          </a:xfrm>
+          <a:prstGeom prst="straightConnector1">
+            <a:avLst/>
+          </a:prstGeom>
+          <a:ln w="38100">
+            <a:solidFill>
+              <a:schemeClr val="tx1"/>
+            </a:solidFill>
+            <a:headEnd type="none" w="med" len="med"/>
+            <a:tailEnd type="triangle" w="med" len="med"/>
+          </a:ln>
+        </p:spPr>
+        <p:style>
+          <a:lnRef idx="1">
+            <a:schemeClr val="accent1"/>
+          </a:lnRef>
+          <a:fillRef idx="0">
+            <a:schemeClr val="accent1"/>
+          </a:fillRef>
+          <a:effectRef idx="0">
+            <a:schemeClr val="accent1"/>
+          </a:effectRef>
+          <a:fontRef idx="minor">
+            <a:schemeClr val="tx1"/>
+          </a:fontRef>
+        </p:style>
+      </p:cxnSp>
+      <p:sp>
+        <p:nvSpPr>
+          <p:cNvPr id="10" name="Flowchart: Alternate Process 9"/>
+          <p:cNvSpPr/>
+          <p:nvPr/>
+        </p:nvSpPr>
+        <p:spPr>
+          <a:xfrm>
+            <a:off x="304800" y="4495800"/>
+            <a:ext cx="1828800" cy="685800"/>
+          </a:xfrm>
+          <a:prstGeom prst="flowChartAlternateProcess">
+            <a:avLst/>
+          </a:prstGeom>
+        </p:spPr>
+        <p:style>
+          <a:lnRef idx="2">
+            <a:schemeClr val="accent1">
+              <a:shade val="50000"/>
+            </a:schemeClr>
+          </a:lnRef>
+          <a:fillRef idx="1">
+            <a:schemeClr val="accent1"/>
+          </a:fillRef>
+          <a:effectRef idx="0">
+            <a:schemeClr val="accent1"/>
+          </a:effectRef>
+          <a:fontRef idx="minor">
+            <a:schemeClr val="lt1"/>
+          </a:fontRef>
+        </p:style>
+        <p:txBody>
+          <a:bodyPr rtlCol="0" anchor="ctr"/>
+          <a:lstStyle/>
+          <a:p>
+            <a:pPr algn="ctr"/>
+            <a:r>
+              <a:rPr lang="en-US" sz="1400" dirty="0" smtClean="0"/>
+              <a:t>Send </a:t>
+            </a:r>
+            <a:r>
+              <a:rPr lang="en-US" sz="1400" dirty="0" err="1" smtClean="0"/>
+              <a:t>RVFCommand</a:t>
+            </a:r>
+            <a:r>
+              <a:rPr lang="en-US" sz="1400" dirty="0" smtClean="0"/>
+              <a:t> to next Node</a:t>
+            </a:r>
+            <a:endParaRPr lang="en-US" sz="1400" dirty="0"/>
+          </a:p>
+        </p:txBody>
+      </p:sp>
+      <p:cxnSp>
+        <p:nvCxnSpPr>
+          <p:cNvPr id="11" name="Straight Arrow Connector 10"/>
+          <p:cNvCxnSpPr>
+            <a:stCxn id="7" idx="2"/>
+            <a:endCxn id="10" idx="0"/>
+          </p:cNvCxnSpPr>
+          <p:nvPr/>
+        </p:nvCxnSpPr>
+        <p:spPr>
+          <a:xfrm>
+            <a:off x="1219200" y="4038600"/>
+            <a:ext cx="0" cy="457200"/>
+          </a:xfrm>
+          <a:prstGeom prst="straightConnector1">
+            <a:avLst/>
+          </a:prstGeom>
+          <a:ln w="38100">
+            <a:solidFill>
+              <a:schemeClr val="tx1"/>
+            </a:solidFill>
+            <a:headEnd type="none" w="med" len="med"/>
+            <a:tailEnd type="triangle" w="med" len="med"/>
+          </a:ln>
+        </p:spPr>
+        <p:style>
+          <a:lnRef idx="1">
+            <a:schemeClr val="accent1"/>
+          </a:lnRef>
+          <a:fillRef idx="0">
+            <a:schemeClr val="accent1"/>
+          </a:fillRef>
+          <a:effectRef idx="0">
+            <a:schemeClr val="accent1"/>
+          </a:effectRef>
+          <a:fontRef idx="minor">
+            <a:schemeClr val="tx1"/>
+          </a:fontRef>
+        </p:style>
+      </p:cxnSp>
+      <p:sp>
+        <p:nvSpPr>
+          <p:cNvPr id="14" name="TextBox 13"/>
+          <p:cNvSpPr txBox="1"/>
+          <p:nvPr/>
+        </p:nvSpPr>
+        <p:spPr>
+          <a:xfrm>
+            <a:off x="2133600" y="3639979"/>
+            <a:ext cx="533400" cy="246221"/>
+          </a:xfrm>
+          <a:prstGeom prst="rect">
+            <a:avLst/>
+          </a:prstGeom>
+          <a:noFill/>
+        </p:spPr>
+        <p:txBody>
+          <a:bodyPr wrap="square" rtlCol="0">
+            <a:spAutoFit/>
+          </a:bodyPr>
+          <a:lstStyle/>
+          <a:p>
+            <a:r>
+              <a:rPr lang="en-US" sz="1000" dirty="0" smtClean="0"/>
+              <a:t>YES</a:t>
+            </a:r>
+            <a:endParaRPr lang="en-US" sz="1000" dirty="0"/>
+          </a:p>
+        </p:txBody>
+      </p:sp>
+      <p:sp>
+        <p:nvSpPr>
+          <p:cNvPr id="16" name="Rounded Rectangle 15"/>
+          <p:cNvSpPr/>
+          <p:nvPr/>
+        </p:nvSpPr>
+        <p:spPr>
+          <a:xfrm>
+            <a:off x="2743200" y="1981200"/>
+            <a:ext cx="1447800" cy="838200"/>
+          </a:xfrm>
+          <a:prstGeom prst="roundRect">
+            <a:avLst/>
+          </a:prstGeom>
+        </p:spPr>
+        <p:style>
+          <a:lnRef idx="2">
+            <a:schemeClr val="accent1">
+              <a:shade val="50000"/>
+            </a:schemeClr>
+          </a:lnRef>
+          <a:fillRef idx="1">
+            <a:schemeClr val="accent1"/>
+          </a:fillRef>
+          <a:effectRef idx="0">
+            <a:schemeClr val="accent1"/>
+          </a:effectRef>
+          <a:fontRef idx="minor">
+            <a:schemeClr val="lt1"/>
+          </a:fontRef>
+        </p:style>
+        <p:txBody>
+          <a:bodyPr rtlCol="0" anchor="ctr"/>
+          <a:lstStyle/>
+          <a:p>
+            <a:pPr algn="ctr"/>
+            <a:r>
+              <a:rPr lang="en-US" sz="1400" dirty="0" smtClean="0"/>
+              <a:t>Process </a:t>
+            </a:r>
+            <a:r>
+              <a:rPr lang="en-US" sz="1400" dirty="0" err="1" smtClean="0"/>
+              <a:t>RVFCommand</a:t>
+            </a:r>
+            <a:r>
+              <a:rPr lang="en-US" sz="1400" dirty="0" smtClean="0"/>
+              <a:t> with Injection Handler</a:t>
+            </a:r>
+            <a:endParaRPr lang="en-US" sz="1400" dirty="0"/>
+          </a:p>
+        </p:txBody>
+      </p:sp>
+      <p:sp>
+        <p:nvSpPr>
+          <p:cNvPr id="17" name="Flowchart: Alternate Process 16"/>
+          <p:cNvSpPr/>
+          <p:nvPr/>
+        </p:nvSpPr>
+        <p:spPr>
+          <a:xfrm>
+            <a:off x="2766950" y="3171110"/>
+            <a:ext cx="1371600" cy="1553290"/>
+          </a:xfrm>
+          <a:prstGeom prst="flowChartAlternateProcess">
+            <a:avLst/>
+          </a:prstGeom>
+        </p:spPr>
+        <p:style>
+          <a:lnRef idx="2">
+            <a:schemeClr val="accent1">
+              <a:shade val="50000"/>
+            </a:schemeClr>
+          </a:lnRef>
+          <a:fillRef idx="1">
+            <a:schemeClr val="accent1"/>
+          </a:fillRef>
+          <a:effectRef idx="0">
+            <a:schemeClr val="accent1"/>
+          </a:effectRef>
+          <a:fontRef idx="minor">
+            <a:schemeClr val="lt1"/>
+          </a:fontRef>
+        </p:style>
+        <p:txBody>
+          <a:bodyPr rtlCol="0" anchor="ctr"/>
+          <a:lstStyle/>
+          <a:p>
+            <a:pPr algn="ctr"/>
+            <a:r>
+              <a:rPr lang="en-US" sz="1400" dirty="0" smtClean="0"/>
+              <a:t>Create </a:t>
+            </a:r>
+            <a:r>
+              <a:rPr lang="en-US" sz="1400" dirty="0" err="1" smtClean="0"/>
+              <a:t>RVFMessage</a:t>
+            </a:r>
+            <a:r>
+              <a:rPr lang="en-US" sz="1400" dirty="0" smtClean="0"/>
+              <a:t> Request to begin Bottom-Up processing for this Node</a:t>
+            </a:r>
+            <a:endParaRPr lang="en-US" sz="1400" dirty="0"/>
+          </a:p>
+        </p:txBody>
+      </p:sp>
+      <p:cxnSp>
+        <p:nvCxnSpPr>
+          <p:cNvPr id="19" name="Elbow Connector 18"/>
+          <p:cNvCxnSpPr>
+            <a:stCxn id="7" idx="3"/>
+            <a:endCxn id="16" idx="1"/>
+          </p:cNvCxnSpPr>
+          <p:nvPr/>
+        </p:nvCxnSpPr>
+        <p:spPr>
+          <a:xfrm flipV="1">
+            <a:off x="2438400" y="2400300"/>
+            <a:ext cx="304800" cy="1143000"/>
+          </a:xfrm>
+          <a:prstGeom prst="bentConnector3">
+            <a:avLst/>
+          </a:prstGeom>
+          <a:ln w="38100">
+            <a:solidFill>
+              <a:schemeClr val="tx1"/>
+            </a:solidFill>
+            <a:headEnd type="none" w="med" len="med"/>
+            <a:tailEnd type="triangle" w="med" len="med"/>
+          </a:ln>
+        </p:spPr>
+        <p:style>
+          <a:lnRef idx="1">
+            <a:schemeClr val="accent1"/>
+          </a:lnRef>
+          <a:fillRef idx="0">
+            <a:schemeClr val="accent1"/>
+          </a:fillRef>
+          <a:effectRef idx="0">
+            <a:schemeClr val="accent1"/>
+          </a:effectRef>
+          <a:fontRef idx="minor">
+            <a:schemeClr val="tx1"/>
+          </a:fontRef>
+        </p:style>
+      </p:cxnSp>
+      <p:cxnSp>
+        <p:nvCxnSpPr>
+          <p:cNvPr id="20" name="Straight Arrow Connector 19"/>
+          <p:cNvCxnSpPr>
+            <a:stCxn id="16" idx="2"/>
+            <a:endCxn id="17" idx="0"/>
+          </p:cNvCxnSpPr>
+          <p:nvPr/>
+        </p:nvCxnSpPr>
+        <p:spPr>
+          <a:xfrm flipH="1">
+            <a:off x="3452750" y="2819400"/>
+            <a:ext cx="14350" cy="351710"/>
+          </a:xfrm>
+          <a:prstGeom prst="straightConnector1">
+            <a:avLst/>
+          </a:prstGeom>
+          <a:ln w="38100">
+            <a:solidFill>
+              <a:schemeClr val="tx1"/>
+            </a:solidFill>
+            <a:headEnd type="none" w="med" len="med"/>
+            <a:tailEnd type="triangle" w="med" len="med"/>
+          </a:ln>
+        </p:spPr>
+        <p:style>
+          <a:lnRef idx="1">
+            <a:schemeClr val="accent1"/>
+          </a:lnRef>
+          <a:fillRef idx="0">
+            <a:schemeClr val="accent1"/>
+          </a:fillRef>
+          <a:effectRef idx="0">
+            <a:schemeClr val="accent1"/>
+          </a:effectRef>
+          <a:fontRef idx="minor">
+            <a:schemeClr val="tx1"/>
+          </a:fontRef>
+        </p:style>
+      </p:cxnSp>
+      <p:sp>
+        <p:nvSpPr>
+          <p:cNvPr id="23" name="Flowchart: Alternate Process 22"/>
+          <p:cNvSpPr/>
+          <p:nvPr/>
+        </p:nvSpPr>
+        <p:spPr>
+          <a:xfrm>
+            <a:off x="2743200" y="5029200"/>
+            <a:ext cx="1395350" cy="1143000"/>
+          </a:xfrm>
+          <a:prstGeom prst="flowChartAlternateProcess">
+            <a:avLst/>
+          </a:prstGeom>
+        </p:spPr>
+        <p:style>
+          <a:lnRef idx="2">
+            <a:schemeClr val="accent1">
+              <a:shade val="50000"/>
+            </a:schemeClr>
+          </a:lnRef>
+          <a:fillRef idx="1">
+            <a:schemeClr val="accent1"/>
+          </a:fillRef>
+          <a:effectRef idx="0">
+            <a:schemeClr val="accent1"/>
+          </a:effectRef>
+          <a:fontRef idx="minor">
+            <a:schemeClr val="lt1"/>
+          </a:fontRef>
+        </p:style>
+        <p:txBody>
+          <a:bodyPr rtlCol="0" anchor="ctr"/>
+          <a:lstStyle/>
+          <a:p>
+            <a:pPr algn="ctr"/>
+            <a:r>
+              <a:rPr lang="en-US" sz="1400" dirty="0" smtClean="0"/>
+              <a:t>Send </a:t>
+            </a:r>
+            <a:r>
+              <a:rPr lang="en-US" sz="1400" dirty="0" err="1" smtClean="0"/>
+              <a:t>RVFMessage</a:t>
+            </a:r>
+            <a:r>
+              <a:rPr lang="en-US" sz="1400" dirty="0" smtClean="0"/>
+              <a:t> as bottom-up request</a:t>
+            </a:r>
+            <a:endParaRPr lang="en-US" sz="1400" dirty="0"/>
+          </a:p>
+        </p:txBody>
+      </p:sp>
+      <p:cxnSp>
+        <p:nvCxnSpPr>
+          <p:cNvPr id="24" name="Straight Arrow Connector 23"/>
+          <p:cNvCxnSpPr>
+            <a:stCxn id="17" idx="2"/>
+            <a:endCxn id="23" idx="0"/>
+          </p:cNvCxnSpPr>
+          <p:nvPr/>
+        </p:nvCxnSpPr>
+        <p:spPr>
+          <a:xfrm flipH="1">
+            <a:off x="3440875" y="4724400"/>
+            <a:ext cx="11875" cy="304800"/>
+          </a:xfrm>
+          <a:prstGeom prst="straightConnector1">
+            <a:avLst/>
+          </a:prstGeom>
+          <a:ln w="38100">
+            <a:solidFill>
+              <a:schemeClr val="tx1"/>
+            </a:solidFill>
+            <a:headEnd type="none" w="med" len="med"/>
+            <a:tailEnd type="triangle" w="med" len="med"/>
+          </a:ln>
+        </p:spPr>
+        <p:style>
+          <a:lnRef idx="1">
+            <a:schemeClr val="accent1"/>
+          </a:lnRef>
+          <a:fillRef idx="0">
+            <a:schemeClr val="accent1"/>
+          </a:fillRef>
+          <a:effectRef idx="0">
+            <a:schemeClr val="accent1"/>
+          </a:effectRef>
+          <a:fontRef idx="minor">
+            <a:schemeClr val="tx1"/>
+          </a:fontRef>
+        </p:style>
+      </p:cxnSp>
+      <p:sp>
+        <p:nvSpPr>
+          <p:cNvPr id="28" name="Flowchart: Decision 27"/>
+          <p:cNvSpPr/>
+          <p:nvPr/>
+        </p:nvSpPr>
+        <p:spPr>
+          <a:xfrm>
+            <a:off x="4460175" y="1828800"/>
+            <a:ext cx="1828800" cy="990600"/>
+          </a:xfrm>
+          <a:prstGeom prst="flowChartDecision">
+            <a:avLst/>
+          </a:prstGeom>
+          <a:solidFill>
+            <a:schemeClr val="accent3"/>
+          </a:solidFill>
+          <a:ln>
+            <a:solidFill>
+              <a:schemeClr val="tx1"/>
+            </a:solidFill>
+          </a:ln>
+        </p:spPr>
+        <p:style>
+          <a:lnRef idx="2">
+            <a:schemeClr val="accent1">
+              <a:shade val="50000"/>
+            </a:schemeClr>
+          </a:lnRef>
+          <a:fillRef idx="1">
+            <a:schemeClr val="accent1"/>
+          </a:fillRef>
+          <a:effectRef idx="0">
+            <a:schemeClr val="accent1"/>
+          </a:effectRef>
+          <a:fontRef idx="minor">
+            <a:schemeClr val="lt1"/>
+          </a:fontRef>
+        </p:style>
+        <p:txBody>
+          <a:bodyPr rtlCol="0" anchor="ctr"/>
+          <a:lstStyle/>
+          <a:p>
+            <a:pPr algn="ctr"/>
+            <a:r>
+              <a:rPr lang="en-US" sz="1200" dirty="0" smtClean="0">
+                <a:solidFill>
+                  <a:schemeClr val="tx1"/>
+                </a:solidFill>
+              </a:rPr>
+              <a:t>Is Node top level controller</a:t>
+            </a:r>
+          </a:p>
+          <a:p>
+            <a:pPr algn="ctr"/>
+            <a:r>
+              <a:rPr lang="en-US" sz="1200" dirty="0" smtClean="0">
+                <a:solidFill>
+                  <a:schemeClr val="tx1"/>
+                </a:solidFill>
+              </a:rPr>
+              <a:t>?</a:t>
+            </a:r>
+          </a:p>
+        </p:txBody>
+      </p:sp>
+      <p:cxnSp>
+        <p:nvCxnSpPr>
+          <p:cNvPr id="30" name="Elbow Connector 29"/>
+          <p:cNvCxnSpPr>
+            <a:stCxn id="23" idx="3"/>
+            <a:endCxn id="28" idx="1"/>
+          </p:cNvCxnSpPr>
+          <p:nvPr/>
+        </p:nvCxnSpPr>
+        <p:spPr>
+          <a:xfrm flipV="1">
+            <a:off x="4138550" y="2324100"/>
+            <a:ext cx="321625" cy="3276600"/>
+          </a:xfrm>
+          <a:prstGeom prst="bentConnector3">
+            <a:avLst/>
+          </a:prstGeom>
+          <a:ln w="38100">
+            <a:solidFill>
+              <a:schemeClr val="tx1"/>
+            </a:solidFill>
+            <a:headEnd type="none" w="med" len="med"/>
+            <a:tailEnd type="triangle" w="med" len="med"/>
+          </a:ln>
+        </p:spPr>
+        <p:style>
+          <a:lnRef idx="1">
+            <a:schemeClr val="accent1"/>
+          </a:lnRef>
+          <a:fillRef idx="0">
+            <a:schemeClr val="accent1"/>
+          </a:fillRef>
+          <a:effectRef idx="0">
+            <a:schemeClr val="accent1"/>
+          </a:effectRef>
+          <a:fontRef idx="minor">
+            <a:schemeClr val="tx1"/>
+          </a:fontRef>
+        </p:style>
+      </p:cxnSp>
+      <p:sp>
+        <p:nvSpPr>
+          <p:cNvPr id="31" name="Flowchart: Alternate Process 30"/>
+          <p:cNvSpPr/>
+          <p:nvPr/>
+        </p:nvSpPr>
+        <p:spPr>
+          <a:xfrm>
+            <a:off x="6746175" y="1828800"/>
+            <a:ext cx="1600200" cy="990600"/>
+          </a:xfrm>
+          <a:prstGeom prst="flowChartAlternateProcess">
+            <a:avLst/>
+          </a:prstGeom>
+        </p:spPr>
+        <p:style>
+          <a:lnRef idx="2">
+            <a:schemeClr val="accent1">
+              <a:shade val="50000"/>
+            </a:schemeClr>
+          </a:lnRef>
+          <a:fillRef idx="1">
+            <a:schemeClr val="accent1"/>
+          </a:fillRef>
+          <a:effectRef idx="0">
+            <a:schemeClr val="accent1"/>
+          </a:effectRef>
+          <a:fontRef idx="minor">
+            <a:schemeClr val="lt1"/>
+          </a:fontRef>
+        </p:style>
+        <p:txBody>
+          <a:bodyPr rtlCol="0" anchor="ctr"/>
+          <a:lstStyle/>
+          <a:p>
+            <a:pPr algn="ctr"/>
+            <a:r>
+              <a:rPr lang="en-US" sz="1400" dirty="0" smtClean="0"/>
+              <a:t>Transform </a:t>
+            </a:r>
+            <a:r>
+              <a:rPr lang="en-US" sz="1400" dirty="0" err="1" smtClean="0"/>
+              <a:t>RVFMessage</a:t>
+            </a:r>
+            <a:r>
+              <a:rPr lang="en-US" sz="1400" dirty="0" smtClean="0"/>
+              <a:t> and pass to next higher level</a:t>
+            </a:r>
+            <a:endParaRPr lang="en-US" sz="1400" dirty="0"/>
+          </a:p>
+        </p:txBody>
+      </p:sp>
+      <p:cxnSp>
+        <p:nvCxnSpPr>
+          <p:cNvPr id="33" name="Straight Arrow Connector 32"/>
+          <p:cNvCxnSpPr>
+            <a:stCxn id="28" idx="3"/>
+            <a:endCxn id="31" idx="1"/>
+          </p:cNvCxnSpPr>
+          <p:nvPr/>
+        </p:nvCxnSpPr>
+        <p:spPr>
+          <a:xfrm>
+            <a:off x="6288975" y="2324100"/>
+            <a:ext cx="457200" cy="0"/>
+          </a:xfrm>
+          <a:prstGeom prst="straightConnector1">
+            <a:avLst/>
+          </a:prstGeom>
+          <a:ln w="38100">
+            <a:solidFill>
+              <a:schemeClr val="tx1"/>
+            </a:solidFill>
+            <a:headEnd type="none" w="med" len="med"/>
+            <a:tailEnd type="triangle" w="med" len="med"/>
+          </a:ln>
+        </p:spPr>
+        <p:style>
+          <a:lnRef idx="1">
+            <a:schemeClr val="accent1"/>
+          </a:lnRef>
+          <a:fillRef idx="0">
+            <a:schemeClr val="accent1"/>
+          </a:fillRef>
+          <a:effectRef idx="0">
+            <a:schemeClr val="accent1"/>
+          </a:effectRef>
+          <a:fontRef idx="minor">
+            <a:schemeClr val="tx1"/>
+          </a:fontRef>
+        </p:style>
+      </p:cxnSp>
+      <p:sp>
+        <p:nvSpPr>
+          <p:cNvPr id="34" name="TextBox 33"/>
+          <p:cNvSpPr txBox="1"/>
+          <p:nvPr/>
+        </p:nvSpPr>
+        <p:spPr>
+          <a:xfrm>
+            <a:off x="838200" y="4114800"/>
+            <a:ext cx="533400" cy="246221"/>
+          </a:xfrm>
+          <a:prstGeom prst="rect">
+            <a:avLst/>
+          </a:prstGeom>
+          <a:noFill/>
+        </p:spPr>
+        <p:txBody>
+          <a:bodyPr wrap="square" rtlCol="0">
+            <a:spAutoFit/>
+          </a:bodyPr>
+          <a:lstStyle/>
+          <a:p>
+            <a:r>
+              <a:rPr lang="en-US" sz="1000" dirty="0" smtClean="0"/>
+              <a:t>NO</a:t>
+            </a:r>
+            <a:endParaRPr lang="en-US" sz="1000" dirty="0"/>
+          </a:p>
+        </p:txBody>
+      </p:sp>
+      <p:sp>
+        <p:nvSpPr>
+          <p:cNvPr id="35" name="TextBox 34"/>
+          <p:cNvSpPr txBox="1"/>
+          <p:nvPr/>
+        </p:nvSpPr>
+        <p:spPr>
+          <a:xfrm>
+            <a:off x="4612575" y="2924889"/>
+            <a:ext cx="533400" cy="246221"/>
+          </a:xfrm>
+          <a:prstGeom prst="rect">
+            <a:avLst/>
+          </a:prstGeom>
+          <a:noFill/>
+        </p:spPr>
+        <p:txBody>
+          <a:bodyPr wrap="square" rtlCol="0">
+            <a:spAutoFit/>
+          </a:bodyPr>
+          <a:lstStyle/>
+          <a:p>
+            <a:r>
+              <a:rPr lang="en-US" sz="1000" dirty="0" smtClean="0"/>
+              <a:t>YES</a:t>
+            </a:r>
+            <a:endParaRPr lang="en-US" sz="1000" dirty="0"/>
+          </a:p>
+        </p:txBody>
+      </p:sp>
+      <p:sp>
+        <p:nvSpPr>
+          <p:cNvPr id="36" name="TextBox 35"/>
+          <p:cNvSpPr txBox="1"/>
+          <p:nvPr/>
+        </p:nvSpPr>
+        <p:spPr>
+          <a:xfrm>
+            <a:off x="6212775" y="2057400"/>
+            <a:ext cx="533400" cy="246221"/>
+          </a:xfrm>
+          <a:prstGeom prst="rect">
+            <a:avLst/>
+          </a:prstGeom>
+          <a:noFill/>
+        </p:spPr>
+        <p:txBody>
+          <a:bodyPr wrap="square" rtlCol="0">
+            <a:spAutoFit/>
+          </a:bodyPr>
+          <a:lstStyle/>
+          <a:p>
+            <a:r>
+              <a:rPr lang="en-US" sz="1000" dirty="0" smtClean="0"/>
+              <a:t>NO</a:t>
+            </a:r>
+            <a:endParaRPr lang="en-US" sz="1000" dirty="0"/>
+          </a:p>
+        </p:txBody>
+      </p:sp>
+      <p:sp>
+        <p:nvSpPr>
+          <p:cNvPr id="37" name="Flowchart: Alternate Process 36"/>
+          <p:cNvSpPr/>
+          <p:nvPr/>
+        </p:nvSpPr>
+        <p:spPr>
+          <a:xfrm>
+            <a:off x="4653150" y="3171110"/>
+            <a:ext cx="1447800" cy="1667590"/>
+          </a:xfrm>
+          <a:prstGeom prst="flowChartAlternateProcess">
+            <a:avLst/>
+          </a:prstGeom>
+        </p:spPr>
+        <p:style>
+          <a:lnRef idx="2">
+            <a:schemeClr val="accent1">
+              <a:shade val="50000"/>
+            </a:schemeClr>
+          </a:lnRef>
+          <a:fillRef idx="1">
+            <a:schemeClr val="accent1"/>
+          </a:fillRef>
+          <a:effectRef idx="0">
+            <a:schemeClr val="accent1"/>
+          </a:effectRef>
+          <a:fontRef idx="minor">
+            <a:schemeClr val="lt1"/>
+          </a:fontRef>
+        </p:style>
+        <p:txBody>
+          <a:bodyPr rtlCol="0" anchor="ctr"/>
+          <a:lstStyle/>
+          <a:p>
+            <a:pPr algn="ctr"/>
+            <a:r>
+              <a:rPr lang="en-US" sz="1400" dirty="0" smtClean="0"/>
+              <a:t>Transform </a:t>
+            </a:r>
+            <a:r>
+              <a:rPr lang="en-US" sz="1400" dirty="0" err="1" smtClean="0"/>
+              <a:t>RVFMessage</a:t>
+            </a:r>
+            <a:r>
+              <a:rPr lang="en-US" sz="1400" dirty="0" smtClean="0"/>
+              <a:t> into HW Controller sequences and apply to HWIF</a:t>
+            </a:r>
+            <a:endParaRPr lang="en-US" sz="1400" dirty="0"/>
+          </a:p>
+        </p:txBody>
+      </p:sp>
+      <p:cxnSp>
+        <p:nvCxnSpPr>
+          <p:cNvPr id="38" name="Straight Arrow Connector 37"/>
+          <p:cNvCxnSpPr>
+            <a:stCxn id="28" idx="2"/>
+            <a:endCxn id="37" idx="0"/>
+          </p:cNvCxnSpPr>
+          <p:nvPr/>
+        </p:nvCxnSpPr>
+        <p:spPr>
+          <a:xfrm>
+            <a:off x="5374575" y="2819400"/>
+            <a:ext cx="2475" cy="351710"/>
+          </a:xfrm>
+          <a:prstGeom prst="straightConnector1">
+            <a:avLst/>
+          </a:prstGeom>
+          <a:ln w="38100">
+            <a:solidFill>
+              <a:schemeClr val="tx1"/>
+            </a:solidFill>
+            <a:headEnd type="none" w="med" len="med"/>
+            <a:tailEnd type="triangle" w="med" len="med"/>
+          </a:ln>
+        </p:spPr>
+        <p:style>
+          <a:lnRef idx="1">
+            <a:schemeClr val="accent1"/>
+          </a:lnRef>
+          <a:fillRef idx="0">
+            <a:schemeClr val="accent1"/>
+          </a:fillRef>
+          <a:effectRef idx="0">
+            <a:schemeClr val="accent1"/>
+          </a:effectRef>
+          <a:fontRef idx="minor">
+            <a:schemeClr val="tx1"/>
+          </a:fontRef>
+        </p:style>
+      </p:cxnSp>
+      <p:sp>
+        <p:nvSpPr>
+          <p:cNvPr id="45" name="Flowchart: Alternate Process 44"/>
+          <p:cNvSpPr/>
+          <p:nvPr/>
+        </p:nvSpPr>
+        <p:spPr>
+          <a:xfrm>
+            <a:off x="4419600" y="5181600"/>
+            <a:ext cx="1905000" cy="1143000"/>
+          </a:xfrm>
+          <a:prstGeom prst="flowChartAlternateProcess">
+            <a:avLst/>
+          </a:prstGeom>
+        </p:spPr>
+        <p:style>
+          <a:lnRef idx="2">
+            <a:schemeClr val="accent1">
+              <a:shade val="50000"/>
+            </a:schemeClr>
+          </a:lnRef>
+          <a:fillRef idx="1">
+            <a:schemeClr val="accent1"/>
+          </a:fillRef>
+          <a:effectRef idx="0">
+            <a:schemeClr val="accent1"/>
+          </a:effectRef>
+          <a:fontRef idx="minor">
+            <a:schemeClr val="lt1"/>
+          </a:fontRef>
+        </p:style>
+        <p:txBody>
+          <a:bodyPr rtlCol="0" anchor="ctr"/>
+          <a:lstStyle/>
+          <a:p>
+            <a:pPr algn="ctr"/>
+            <a:r>
+              <a:rPr lang="en-US" sz="1400" dirty="0" smtClean="0"/>
+              <a:t>Create </a:t>
+            </a:r>
+            <a:r>
+              <a:rPr lang="en-US" sz="1400" dirty="0" err="1" smtClean="0"/>
+              <a:t>RVFMessage</a:t>
+            </a:r>
+            <a:r>
+              <a:rPr lang="en-US" sz="1400" dirty="0" smtClean="0"/>
+              <a:t> Response from HWIF response and return Response to requester</a:t>
+            </a:r>
+            <a:endParaRPr lang="en-US" sz="1400" dirty="0"/>
+          </a:p>
+        </p:txBody>
+      </p:sp>
+      <p:cxnSp>
+        <p:nvCxnSpPr>
+          <p:cNvPr id="46" name="Straight Arrow Connector 45"/>
+          <p:cNvCxnSpPr>
+            <a:stCxn id="37" idx="2"/>
+            <a:endCxn id="45" idx="0"/>
+          </p:cNvCxnSpPr>
+          <p:nvPr/>
+        </p:nvCxnSpPr>
+        <p:spPr>
+          <a:xfrm flipH="1">
+            <a:off x="5372100" y="4838700"/>
+            <a:ext cx="4950" cy="342900"/>
+          </a:xfrm>
+          <a:prstGeom prst="straightConnector1">
+            <a:avLst/>
+          </a:prstGeom>
+          <a:ln w="38100">
+            <a:solidFill>
+              <a:schemeClr val="tx1"/>
+            </a:solidFill>
+            <a:headEnd type="none" w="med" len="med"/>
+            <a:tailEnd type="triangle" w="med" len="med"/>
+          </a:ln>
+        </p:spPr>
+        <p:style>
+          <a:lnRef idx="1">
+            <a:schemeClr val="accent1"/>
+          </a:lnRef>
+          <a:fillRef idx="0">
+            <a:schemeClr val="accent1"/>
+          </a:fillRef>
+          <a:effectRef idx="0">
+            <a:schemeClr val="accent1"/>
+          </a:effectRef>
+          <a:fontRef idx="minor">
+            <a:schemeClr val="tx1"/>
+          </a:fontRef>
+        </p:style>
+      </p:cxnSp>
+      <p:sp>
+        <p:nvSpPr>
+          <p:cNvPr id="49" name="Flowchart: Decision 48"/>
+          <p:cNvSpPr/>
+          <p:nvPr/>
+        </p:nvSpPr>
+        <p:spPr>
+          <a:xfrm>
+            <a:off x="6593775" y="2932709"/>
+            <a:ext cx="1775361" cy="1239982"/>
+          </a:xfrm>
+          <a:prstGeom prst="flowChartDecision">
+            <a:avLst/>
+          </a:prstGeom>
+          <a:solidFill>
+            <a:schemeClr val="accent3"/>
+          </a:solidFill>
+          <a:ln>
+            <a:solidFill>
+              <a:schemeClr val="tx1"/>
+            </a:solidFill>
+          </a:ln>
+        </p:spPr>
+        <p:style>
+          <a:lnRef idx="2">
+            <a:schemeClr val="accent1">
+              <a:shade val="50000"/>
+            </a:schemeClr>
+          </a:lnRef>
+          <a:fillRef idx="1">
+            <a:schemeClr val="accent1"/>
+          </a:fillRef>
+          <a:effectRef idx="0">
+            <a:schemeClr val="accent1"/>
+          </a:effectRef>
+          <a:fontRef idx="minor">
+            <a:schemeClr val="lt1"/>
+          </a:fontRef>
+        </p:style>
+        <p:txBody>
+          <a:bodyPr rtlCol="0" anchor="ctr"/>
+          <a:lstStyle/>
+          <a:p>
+            <a:pPr algn="ctr"/>
+            <a:r>
+              <a:rPr lang="en-US" sz="1200" dirty="0" smtClean="0">
+                <a:solidFill>
+                  <a:schemeClr val="tx1"/>
+                </a:solidFill>
+              </a:rPr>
+              <a:t>Is Node command request node</a:t>
+            </a:r>
+          </a:p>
+          <a:p>
+            <a:pPr algn="ctr"/>
+            <a:r>
+              <a:rPr lang="en-US" sz="1200" dirty="0" smtClean="0">
+                <a:solidFill>
+                  <a:schemeClr val="tx1"/>
+                </a:solidFill>
+              </a:rPr>
+              <a:t>?</a:t>
+            </a:r>
+          </a:p>
+        </p:txBody>
+      </p:sp>
+      <p:cxnSp>
+        <p:nvCxnSpPr>
+          <p:cNvPr id="51" name="Elbow Connector 50"/>
+          <p:cNvCxnSpPr>
+            <a:stCxn id="45" idx="3"/>
+            <a:endCxn id="49" idx="1"/>
+          </p:cNvCxnSpPr>
+          <p:nvPr/>
+        </p:nvCxnSpPr>
+        <p:spPr>
+          <a:xfrm flipV="1">
+            <a:off x="6324600" y="3552700"/>
+            <a:ext cx="269175" cy="2200400"/>
+          </a:xfrm>
+          <a:prstGeom prst="bentConnector3">
+            <a:avLst/>
+          </a:prstGeom>
+          <a:ln w="38100">
+            <a:solidFill>
+              <a:schemeClr val="tx1"/>
+            </a:solidFill>
+            <a:headEnd type="none" w="med" len="med"/>
+            <a:tailEnd type="triangle" w="med" len="med"/>
+          </a:ln>
+        </p:spPr>
+        <p:style>
+          <a:lnRef idx="1">
+            <a:schemeClr val="accent1"/>
+          </a:lnRef>
+          <a:fillRef idx="0">
+            <a:schemeClr val="accent1"/>
+          </a:fillRef>
+          <a:effectRef idx="0">
+            <a:schemeClr val="accent1"/>
+          </a:effectRef>
+          <a:fontRef idx="minor">
+            <a:schemeClr val="tx1"/>
+          </a:fontRef>
+        </p:style>
+      </p:cxnSp>
+      <p:sp>
+        <p:nvSpPr>
+          <p:cNvPr id="58" name="Flowchart: Alternate Process 57"/>
+          <p:cNvSpPr/>
+          <p:nvPr/>
+        </p:nvSpPr>
+        <p:spPr>
+          <a:xfrm>
+            <a:off x="6593774" y="5219700"/>
+            <a:ext cx="1559625" cy="1333500"/>
+          </a:xfrm>
+          <a:prstGeom prst="flowChartAlternateProcess">
+            <a:avLst/>
+          </a:prstGeom>
+        </p:spPr>
+        <p:style>
+          <a:lnRef idx="2">
+            <a:schemeClr val="accent1">
+              <a:shade val="50000"/>
+            </a:schemeClr>
+          </a:lnRef>
+          <a:fillRef idx="1">
+            <a:schemeClr val="accent1"/>
+          </a:fillRef>
+          <a:effectRef idx="0">
+            <a:schemeClr val="accent1"/>
+          </a:effectRef>
+          <a:fontRef idx="minor">
+            <a:schemeClr val="lt1"/>
+          </a:fontRef>
+        </p:style>
+        <p:txBody>
+          <a:bodyPr rtlCol="0" anchor="ctr"/>
+          <a:lstStyle/>
+          <a:p>
+            <a:pPr algn="ctr"/>
+            <a:r>
+              <a:rPr lang="en-US" sz="1400" dirty="0" smtClean="0"/>
+              <a:t>Create </a:t>
+            </a:r>
+            <a:r>
+              <a:rPr lang="en-US" sz="1400" dirty="0" err="1" smtClean="0"/>
+              <a:t>RVFCommand</a:t>
+            </a:r>
+            <a:r>
+              <a:rPr lang="en-US" sz="1400" dirty="0" smtClean="0"/>
+              <a:t> response and return response to command application</a:t>
+            </a:r>
+            <a:endParaRPr lang="en-US" sz="1400" dirty="0"/>
+          </a:p>
+        </p:txBody>
+      </p:sp>
+      <p:cxnSp>
+        <p:nvCxnSpPr>
+          <p:cNvPr id="60" name="Elbow Connector 59"/>
+          <p:cNvCxnSpPr>
+            <a:stCxn id="49" idx="2"/>
+            <a:endCxn id="58" idx="0"/>
+          </p:cNvCxnSpPr>
+          <p:nvPr/>
+        </p:nvCxnSpPr>
+        <p:spPr>
+          <a:xfrm rot="5400000">
+            <a:off x="6904018" y="4642261"/>
+            <a:ext cx="1047009" cy="107869"/>
+          </a:xfrm>
+          <a:prstGeom prst="bentConnector3">
+            <a:avLst/>
+          </a:prstGeom>
+          <a:ln w="38100">
+            <a:solidFill>
+              <a:schemeClr val="tx1"/>
+            </a:solidFill>
+            <a:headEnd type="none" w="med" len="med"/>
+            <a:tailEnd type="triangle" w="med" len="med"/>
+          </a:ln>
+        </p:spPr>
+        <p:style>
+          <a:lnRef idx="1">
+            <a:schemeClr val="accent1"/>
+          </a:lnRef>
+          <a:fillRef idx="0">
+            <a:schemeClr val="accent1"/>
+          </a:fillRef>
+          <a:effectRef idx="0">
+            <a:schemeClr val="accent1"/>
+          </a:effectRef>
+          <a:fontRef idx="minor">
+            <a:schemeClr val="tx1"/>
+          </a:fontRef>
+        </p:style>
+      </p:cxnSp>
+      <p:sp>
+        <p:nvSpPr>
+          <p:cNvPr id="61" name="TextBox 60"/>
+          <p:cNvSpPr txBox="1"/>
+          <p:nvPr/>
+        </p:nvSpPr>
+        <p:spPr>
+          <a:xfrm>
+            <a:off x="6822375" y="4249579"/>
+            <a:ext cx="533400" cy="246221"/>
+          </a:xfrm>
+          <a:prstGeom prst="rect">
+            <a:avLst/>
+          </a:prstGeom>
+          <a:noFill/>
+        </p:spPr>
+        <p:txBody>
+          <a:bodyPr wrap="square" rtlCol="0">
+            <a:spAutoFit/>
+          </a:bodyPr>
+          <a:lstStyle/>
+          <a:p>
+            <a:r>
+              <a:rPr lang="en-US" sz="1000" dirty="0" smtClean="0"/>
+              <a:t>YES</a:t>
+            </a:r>
+            <a:endParaRPr lang="en-US" sz="1000" dirty="0"/>
+          </a:p>
+        </p:txBody>
+      </p:sp>
+      <p:sp>
+        <p:nvSpPr>
+          <p:cNvPr id="62" name="Flowchart: Alternate Process 61"/>
+          <p:cNvSpPr/>
+          <p:nvPr/>
+        </p:nvSpPr>
+        <p:spPr>
+          <a:xfrm>
+            <a:off x="7696201" y="4166753"/>
+            <a:ext cx="1371598" cy="843397"/>
+          </a:xfrm>
+          <a:prstGeom prst="flowChartAlternateProcess">
+            <a:avLst/>
+          </a:prstGeom>
+        </p:spPr>
+        <p:style>
+          <a:lnRef idx="2">
+            <a:schemeClr val="accent1">
+              <a:shade val="50000"/>
+            </a:schemeClr>
+          </a:lnRef>
+          <a:fillRef idx="1">
+            <a:schemeClr val="accent1"/>
+          </a:fillRef>
+          <a:effectRef idx="0">
+            <a:schemeClr val="accent1"/>
+          </a:effectRef>
+          <a:fontRef idx="minor">
+            <a:schemeClr val="lt1"/>
+          </a:fontRef>
+        </p:style>
+        <p:txBody>
+          <a:bodyPr rtlCol="0" anchor="ctr"/>
+          <a:lstStyle/>
+          <a:p>
+            <a:pPr algn="ctr"/>
+            <a:r>
+              <a:rPr lang="en-US" sz="1400" dirty="0" smtClean="0"/>
+              <a:t>Send </a:t>
+            </a:r>
+            <a:r>
+              <a:rPr lang="en-US" sz="1400" dirty="0" err="1" smtClean="0"/>
+              <a:t>RVFMessage</a:t>
+            </a:r>
+            <a:r>
+              <a:rPr lang="en-US" sz="1400" dirty="0" smtClean="0"/>
+              <a:t> to next lowest level</a:t>
+            </a:r>
+            <a:endParaRPr lang="en-US" sz="1400" dirty="0"/>
+          </a:p>
+        </p:txBody>
+      </p:sp>
+      <p:cxnSp>
+        <p:nvCxnSpPr>
+          <p:cNvPr id="64" name="Elbow Connector 63"/>
+          <p:cNvCxnSpPr>
+            <a:stCxn id="49" idx="3"/>
+            <a:endCxn id="62" idx="0"/>
+          </p:cNvCxnSpPr>
+          <p:nvPr/>
+        </p:nvCxnSpPr>
+        <p:spPr>
+          <a:xfrm>
+            <a:off x="8369136" y="3552700"/>
+            <a:ext cx="12864" cy="614053"/>
+          </a:xfrm>
+          <a:prstGeom prst="bentConnector2">
+            <a:avLst/>
+          </a:prstGeom>
+          <a:ln w="38100">
+            <a:solidFill>
+              <a:schemeClr val="tx1"/>
+            </a:solidFill>
+            <a:headEnd type="none" w="med" len="med"/>
+            <a:tailEnd type="triangle" w="med" len="med"/>
+          </a:ln>
+        </p:spPr>
+        <p:style>
+          <a:lnRef idx="1">
+            <a:schemeClr val="accent1"/>
+          </a:lnRef>
+          <a:fillRef idx="0">
+            <a:schemeClr val="accent1"/>
+          </a:fillRef>
+          <a:effectRef idx="0">
+            <a:schemeClr val="accent1"/>
+          </a:effectRef>
+          <a:fontRef idx="minor">
+            <a:schemeClr val="tx1"/>
+          </a:fontRef>
+        </p:style>
+      </p:cxnSp>
+      <p:sp>
+        <p:nvSpPr>
+          <p:cNvPr id="70" name="TextBox 69"/>
+          <p:cNvSpPr txBox="1"/>
+          <p:nvPr/>
+        </p:nvSpPr>
+        <p:spPr>
+          <a:xfrm>
+            <a:off x="8382000" y="3716179"/>
+            <a:ext cx="533400" cy="246221"/>
+          </a:xfrm>
+          <a:prstGeom prst="rect">
+            <a:avLst/>
+          </a:prstGeom>
+          <a:noFill/>
+        </p:spPr>
+        <p:txBody>
+          <a:bodyPr wrap="square" rtlCol="0">
+            <a:spAutoFit/>
+          </a:bodyPr>
+          <a:lstStyle/>
+          <a:p>
+            <a:r>
+              <a:rPr lang="en-US" sz="1000" dirty="0" smtClean="0"/>
+              <a:t>NO</a:t>
+            </a:r>
+            <a:endParaRPr lang="en-US" sz="1000" dirty="0"/>
+          </a:p>
+        </p:txBody>
+      </p:sp>
+    </p:spTree>
+    <p:extLst>
+      <p:ext uri="{BB962C8B-B14F-4D97-AF65-F5344CB8AC3E}">
+        <p14:creationId xmlns:p14="http://schemas.microsoft.com/office/powerpoint/2010/main" val="1113837955"/>
+      </p:ext>
+    </p:extLst>
+  </p:cSld>
+  <p:clrMapOvr>
+    <a:masterClrMapping/>
+  </p:clrMapOvr>
+</p:sld>
+</file>
+
 <file path=ppt/slides/slide2.xml><?xml version="1.0" encoding="utf-8"?>
 <p:sld xmlns:a="http://schemas.openxmlformats.org/drawingml/2006/main" xmlns:r="http://schemas.openxmlformats.org/officeDocument/2006/relationships" xmlns:p="http://schemas.openxmlformats.org/presentationml/2006/main">
   <p:cSld>
@@ -4103,15 +6713,7 @@
           <a:p>
             <a:r>
               <a:rPr lang="en-US" dirty="0" smtClean="0"/>
-              <a:t>“transfer module” is </a:t>
-            </a:r>
-            <a:r>
-              <a:rPr lang="en-US" dirty="0" smtClean="0"/>
-              <a:t>responsible </a:t>
-            </a:r>
-            <a:r>
-              <a:rPr lang="en-US" dirty="0" smtClean="0"/>
-              <a:t>for </a:t>
+              <a:t>“transfer module” is responsible for </a:t>
             </a:r>
             <a:r>
               <a:rPr lang="en-US" dirty="0" err="1" smtClean="0"/>
@@ -5515,23 +8117,7 @@
                   <a:schemeClr val="tx1"/>
                 </a:solidFill>
               </a:rPr>
-              <a:t> and calls appropriate transfer procedure </a:t>
-            </a:r>
-            <a:r>
-              <a:rPr lang="en-US" sz="1200" dirty="0" smtClean="0">
-                <a:solidFill>
-                  <a:schemeClr val="tx1"/>
-                </a:solidFill>
-              </a:rPr>
-              <a:t>associated </a:t>
-            </a:r>
-            <a:r>
-              <a:rPr lang="en-US" sz="1200" dirty="0" smtClean="0">
-                <a:solidFill>
-                  <a:schemeClr val="tx1"/>
-                </a:solidFill>
-              </a:rPr>
-              <a:t>with </a:t>
+              <a:t> and calls appropriate transfer procedure associated with </a:t>
             </a:r>
             <a:r>
               <a:rPr lang="en-US" sz="1200" dirty="0" err="1" smtClean="0">
@@ -6953,23 +9539,7 @@
                   <a:schemeClr val="tx1"/>
                 </a:solidFill>
               </a:rPr>
-              <a:t> and calls appropriate transfer procedure </a:t>
-            </a:r>
-            <a:r>
-              <a:rPr lang="en-US" sz="1200" dirty="0" smtClean="0">
-                <a:solidFill>
-                  <a:schemeClr val="tx1"/>
-                </a:solidFill>
-              </a:rPr>
-              <a:t>associated </a:t>
-            </a:r>
-            <a:r>
-              <a:rPr lang="en-US" sz="1200" dirty="0" smtClean="0">
-                <a:solidFill>
-                  <a:schemeClr val="tx1"/>
-                </a:solidFill>
-              </a:rPr>
-              <a:t>with </a:t>
+              <a:t> and calls appropriate transfer procedure associated with </a:t>
             </a:r>
             <a:r>
               <a:rPr lang="en-US" sz="1200" dirty="0" err="1" smtClean="0">
@@ -7478,11 +10048,7 @@
             <a:pPr algn="ctr"/>
             <a:r>
               <a:rPr lang="en-US" dirty="0" smtClean="0"/>
-              <a:t>Message2 </a:t>
-            </a:r>
-            <a:r>
-              <a:rPr lang="en-US" dirty="0" smtClean="0"/>
-              <a:t>Handler</a:t>
+              <a:t>Message2 Handler</a:t>
             </a:r>
             <a:endParaRPr lang="en-US" dirty="0"/>
           </a:p>
@@ -7526,11 +10092,7 @@
             <a:pPr algn="ctr"/>
             <a:r>
               <a:rPr lang="en-US" dirty="0" smtClean="0"/>
-              <a:t>Message3 </a:t>
-            </a:r>
-            <a:r>
-              <a:rPr lang="en-US" dirty="0" smtClean="0"/>
-              <a:t>Handler</a:t>
+              <a:t>Message3 Handler</a:t>
             </a:r>
             <a:endParaRPr lang="en-US" dirty="0"/>
           </a:p>
@@ -7739,6 +10301,82 @@
     <p:extLst>
       <p:ext uri="{BB962C8B-B14F-4D97-AF65-F5344CB8AC3E}">
         <p14:creationId xmlns:p14="http://schemas.microsoft.com/office/powerpoint/2010/main" val="3101782956"/>
+      </p:ext>
+    </p:extLst>
+  </p:cSld>
+  <p:clrMapOvr>
+    <a:masterClrMapping/>
+  </p:clrMapOvr>
+</p:sld>
+</file>
+
+<file path=ppt/slides/slide9.xml><?xml version="1.0" encoding="utf-8"?>
+<p:sld xmlns:a="http://schemas.openxmlformats.org/drawingml/2006/main" xmlns:r="http://schemas.openxmlformats.org/officeDocument/2006/relationships" xmlns:p="http://schemas.openxmlformats.org/presentationml/2006/main">
+  <p:cSld>
+    <p:spTree>
+      <p:nvGrpSpPr>
+        <p:cNvPr id="1" name=""/>
+        <p:cNvGrpSpPr/>
+        <p:nvPr/>
+      </p:nvGrpSpPr>
+      <p:grpSpPr>
+        <a:xfrm>
+          <a:off x="0" y="0"/>
+          <a:ext cx="0" cy="0"/>
+          <a:chOff x="0" y="0"/>
+          <a:chExt cx="0" cy="0"/>
+        </a:xfrm>
+      </p:grpSpPr>
+      <p:sp>
+        <p:nvSpPr>
+          <p:cNvPr id="3" name="Title 2"/>
+          <p:cNvSpPr>
+            <a:spLocks noGrp="1"/>
+          </p:cNvSpPr>
+          <p:nvPr>
+            <p:ph type="title"/>
+          </p:nvPr>
+        </p:nvSpPr>
+        <p:spPr/>
+        <p:txBody>
+          <a:bodyPr/>
+          <a:lstStyle/>
+          <a:p>
+            <a:r>
+              <a:rPr lang="en-US" dirty="0" smtClean="0"/>
+              <a:t>Additional Slides since 20210720</a:t>
+            </a:r>
+            <a:endParaRPr lang="en-US" dirty="0"/>
+          </a:p>
+        </p:txBody>
+      </p:sp>
+      <p:sp>
+        <p:nvSpPr>
+          <p:cNvPr id="4" name="Text Placeholder 3"/>
+          <p:cNvSpPr>
+            <a:spLocks noGrp="1"/>
+          </p:cNvSpPr>
+          <p:nvPr>
+            <p:ph type="body" idx="1"/>
+          </p:nvPr>
+        </p:nvSpPr>
+        <p:spPr/>
+        <p:txBody>
+          <a:bodyPr/>
+          <a:lstStyle/>
+          <a:p>
+            <a:r>
+              <a:rPr lang="en-US" dirty="0" smtClean="0"/>
+              <a:t>20210801 Content</a:t>
+            </a:r>
+            <a:endParaRPr lang="en-US" dirty="0"/>
+          </a:p>
+        </p:txBody>
+      </p:sp>
+    </p:spTree>
+    <p:extLst>
+      <p:ext uri="{BB962C8B-B14F-4D97-AF65-F5344CB8AC3E}">
+        <p14:creationId xmlns:p14="http://schemas.microsoft.com/office/powerpoint/2010/main" val="2551084929"/>
       </p:ext>
     </p:extLst>
   </p:cSld>

</xml_diff>

<commit_message>
Added clariication during P2654 meeting based of feedback
</commit_message>
<xml_diff>
--- a/docs/MJBUnification20210720.pptx
+++ b/docs/MJBUnification20210720.pptx
@@ -317,7 +317,7 @@
           <a:p>
             <a:fld id="{66DB5DB1-C2D9-4EE3-9A9C-38A3A17F68D3}" type="datetimeFigureOut">
               <a:rPr lang="en-US" smtClean="0"/>
-              <a:t>8/1/2021</a:t>
+              <a:t>8/2/2021</a:t>
             </a:fld>
             <a:endParaRPr lang="en-US"/>
           </a:p>
@@ -490,7 +490,7 @@
           <a:p>
             <a:fld id="{66DB5DB1-C2D9-4EE3-9A9C-38A3A17F68D3}" type="datetimeFigureOut">
               <a:rPr lang="en-US" smtClean="0"/>
-              <a:t>8/1/2021</a:t>
+              <a:t>8/2/2021</a:t>
             </a:fld>
             <a:endParaRPr lang="en-US"/>
           </a:p>
@@ -715,7 +715,7 @@
           <a:p>
             <a:fld id="{66DB5DB1-C2D9-4EE3-9A9C-38A3A17F68D3}" type="datetimeFigureOut">
               <a:rPr lang="en-US" smtClean="0"/>
-              <a:t>8/1/2021</a:t>
+              <a:t>8/2/2021</a:t>
             </a:fld>
             <a:endParaRPr lang="en-US"/>
           </a:p>
@@ -864,7 +864,7 @@
           <a:p>
             <a:fld id="{66DB5DB1-C2D9-4EE3-9A9C-38A3A17F68D3}" type="datetimeFigureOut">
               <a:rPr lang="en-US" smtClean="0"/>
-              <a:t>8/1/2021</a:t>
+              <a:t>8/2/2021</a:t>
             </a:fld>
             <a:endParaRPr lang="en-US"/>
           </a:p>
@@ -1335,7 +1335,7 @@
           <a:p>
             <a:fld id="{66DB5DB1-C2D9-4EE3-9A9C-38A3A17F68D3}" type="datetimeFigureOut">
               <a:rPr lang="en-US" smtClean="0"/>
-              <a:t>8/1/2021</a:t>
+              <a:t>8/2/2021</a:t>
             </a:fld>
             <a:endParaRPr lang="en-US"/>
           </a:p>
@@ -1499,7 +1499,7 @@
           <a:p>
             <a:fld id="{66DB5DB1-C2D9-4EE3-9A9C-38A3A17F68D3}" type="datetimeFigureOut">
               <a:rPr lang="en-US" smtClean="0"/>
-              <a:t>8/1/2021</a:t>
+              <a:t>8/2/2021</a:t>
             </a:fld>
             <a:endParaRPr lang="en-US"/>
           </a:p>
@@ -1971,7 +1971,7 @@
           <a:p>
             <a:fld id="{66DB5DB1-C2D9-4EE3-9A9C-38A3A17F68D3}" type="datetimeFigureOut">
               <a:rPr lang="en-US" smtClean="0"/>
-              <a:t>8/1/2021</a:t>
+              <a:t>8/2/2021</a:t>
             </a:fld>
             <a:endParaRPr lang="en-US"/>
           </a:p>
@@ -2092,7 +2092,7 @@
           <a:p>
             <a:fld id="{66DB5DB1-C2D9-4EE3-9A9C-38A3A17F68D3}" type="datetimeFigureOut">
               <a:rPr lang="en-US" smtClean="0"/>
-              <a:t>8/1/2021</a:t>
+              <a:t>8/2/2021</a:t>
             </a:fld>
             <a:endParaRPr lang="en-US"/>
           </a:p>
@@ -2190,7 +2190,7 @@
           <a:p>
             <a:fld id="{66DB5DB1-C2D9-4EE3-9A9C-38A3A17F68D3}" type="datetimeFigureOut">
               <a:rPr lang="en-US" smtClean="0"/>
-              <a:t>8/1/2021</a:t>
+              <a:t>8/2/2021</a:t>
             </a:fld>
             <a:endParaRPr lang="en-US"/>
           </a:p>
@@ -2486,7 +2486,7 @@
           <a:p>
             <a:fld id="{66DB5DB1-C2D9-4EE3-9A9C-38A3A17F68D3}" type="datetimeFigureOut">
               <a:rPr lang="en-US" smtClean="0"/>
-              <a:t>8/1/2021</a:t>
+              <a:t>8/2/2021</a:t>
             </a:fld>
             <a:endParaRPr lang="en-US"/>
           </a:p>
@@ -2721,7 +2721,7 @@
           <a:p>
             <a:fld id="{66DB5DB1-C2D9-4EE3-9A9C-38A3A17F68D3}" type="datetimeFigureOut">
               <a:rPr lang="en-US" smtClean="0"/>
-              <a:t>8/1/2021</a:t>
+              <a:t>8/2/2021</a:t>
             </a:fld>
             <a:endParaRPr lang="en-US"/>
           </a:p>
@@ -3193,7 +3193,7 @@
           <a:p>
             <a:fld id="{66DB5DB1-C2D9-4EE3-9A9C-38A3A17F68D3}" type="datetimeFigureOut">
               <a:rPr lang="en-US" smtClean="0"/>
-              <a:t>8/1/2021</a:t>
+              <a:t>8/2/2021</a:t>
             </a:fld>
             <a:endParaRPr lang="en-US"/>
           </a:p>
@@ -4738,6 +4738,350 @@
           </a:p>
         </p:txBody>
       </p:sp>
+      <p:sp>
+        <p:nvSpPr>
+          <p:cNvPr id="2" name="Flowchart: Magnetic Disk 1"/>
+          <p:cNvSpPr/>
+          <p:nvPr/>
+        </p:nvSpPr>
+        <p:spPr>
+          <a:xfrm>
+            <a:off x="2379562" y="1502300"/>
+            <a:ext cx="838200" cy="728246"/>
+          </a:xfrm>
+          <a:prstGeom prst="flowChartMagneticDisk">
+            <a:avLst/>
+          </a:prstGeom>
+        </p:spPr>
+        <p:style>
+          <a:lnRef idx="2">
+            <a:schemeClr val="accent1">
+              <a:shade val="50000"/>
+            </a:schemeClr>
+          </a:lnRef>
+          <a:fillRef idx="1">
+            <a:schemeClr val="accent1"/>
+          </a:fillRef>
+          <a:effectRef idx="0">
+            <a:schemeClr val="accent1"/>
+          </a:effectRef>
+          <a:fontRef idx="minor">
+            <a:schemeClr val="lt1"/>
+          </a:fontRef>
+        </p:style>
+        <p:txBody>
+          <a:bodyPr rtlCol="0" anchor="ctr"/>
+          <a:lstStyle/>
+          <a:p>
+            <a:pPr algn="ctr"/>
+            <a:r>
+              <a:rPr lang="en-US" sz="1200" dirty="0" smtClean="0"/>
+              <a:t>Injection Library</a:t>
+            </a:r>
+            <a:endParaRPr lang="en-US" sz="1200" dirty="0"/>
+          </a:p>
+        </p:txBody>
+      </p:sp>
+      <p:sp>
+        <p:nvSpPr>
+          <p:cNvPr id="36" name="Flowchart: Magnetic Disk 35"/>
+          <p:cNvSpPr/>
+          <p:nvPr/>
+        </p:nvSpPr>
+        <p:spPr>
+          <a:xfrm>
+            <a:off x="5943600" y="1502300"/>
+            <a:ext cx="838200" cy="728246"/>
+          </a:xfrm>
+          <a:prstGeom prst="flowChartMagneticDisk">
+            <a:avLst/>
+          </a:prstGeom>
+        </p:spPr>
+        <p:style>
+          <a:lnRef idx="2">
+            <a:schemeClr val="accent1">
+              <a:shade val="50000"/>
+            </a:schemeClr>
+          </a:lnRef>
+          <a:fillRef idx="1">
+            <a:schemeClr val="accent1"/>
+          </a:fillRef>
+          <a:effectRef idx="0">
+            <a:schemeClr val="accent1"/>
+          </a:effectRef>
+          <a:fontRef idx="minor">
+            <a:schemeClr val="lt1"/>
+          </a:fontRef>
+        </p:style>
+        <p:txBody>
+          <a:bodyPr rtlCol="0" anchor="ctr"/>
+          <a:lstStyle/>
+          <a:p>
+            <a:pPr algn="ctr"/>
+            <a:r>
+              <a:rPr lang="en-US" sz="1200" dirty="0" smtClean="0"/>
+              <a:t>Injection Library</a:t>
+            </a:r>
+            <a:endParaRPr lang="en-US" sz="1200" dirty="0"/>
+          </a:p>
+        </p:txBody>
+      </p:sp>
+      <p:cxnSp>
+        <p:nvCxnSpPr>
+          <p:cNvPr id="11" name="Elbow Connector 10"/>
+          <p:cNvCxnSpPr>
+            <a:stCxn id="2" idx="3"/>
+            <a:endCxn id="5" idx="0"/>
+          </p:cNvCxnSpPr>
+          <p:nvPr/>
+        </p:nvCxnSpPr>
+        <p:spPr>
+          <a:xfrm rot="5400000">
+            <a:off x="2590804" y="2382942"/>
+            <a:ext cx="360254" cy="55462"/>
+          </a:xfrm>
+          <a:prstGeom prst="bentConnector3">
+            <a:avLst/>
+          </a:prstGeom>
+          <a:ln w="38100">
+            <a:solidFill>
+              <a:schemeClr val="tx1"/>
+            </a:solidFill>
+            <a:headEnd type="triangle" w="med" len="med"/>
+            <a:tailEnd type="triangle" w="med" len="med"/>
+          </a:ln>
+        </p:spPr>
+        <p:style>
+          <a:lnRef idx="1">
+            <a:schemeClr val="accent1"/>
+          </a:lnRef>
+          <a:fillRef idx="0">
+            <a:schemeClr val="accent1"/>
+          </a:fillRef>
+          <a:effectRef idx="0">
+            <a:schemeClr val="accent1"/>
+          </a:effectRef>
+          <a:fontRef idx="minor">
+            <a:schemeClr val="tx1"/>
+          </a:fontRef>
+        </p:style>
+      </p:cxnSp>
+      <p:cxnSp>
+        <p:nvCxnSpPr>
+          <p:cNvPr id="38" name="Elbow Connector 37"/>
+          <p:cNvCxnSpPr>
+            <a:stCxn id="36" idx="3"/>
+            <a:endCxn id="8" idx="0"/>
+          </p:cNvCxnSpPr>
+          <p:nvPr/>
+        </p:nvCxnSpPr>
+        <p:spPr>
+          <a:xfrm rot="5400000">
+            <a:off x="6108546" y="2370400"/>
+            <a:ext cx="394008" cy="114300"/>
+          </a:xfrm>
+          <a:prstGeom prst="bentConnector3">
+            <a:avLst>
+              <a:gd name="adj1" fmla="val 50000"/>
+            </a:avLst>
+          </a:prstGeom>
+          <a:ln w="38100">
+            <a:solidFill>
+              <a:schemeClr val="tx1"/>
+            </a:solidFill>
+            <a:headEnd type="triangle" w="med" len="med"/>
+            <a:tailEnd type="triangle" w="med" len="med"/>
+          </a:ln>
+        </p:spPr>
+        <p:style>
+          <a:lnRef idx="1">
+            <a:schemeClr val="accent1"/>
+          </a:lnRef>
+          <a:fillRef idx="0">
+            <a:schemeClr val="accent1"/>
+          </a:fillRef>
+          <a:effectRef idx="0">
+            <a:schemeClr val="accent1"/>
+          </a:effectRef>
+          <a:fontRef idx="minor">
+            <a:schemeClr val="tx1"/>
+          </a:fontRef>
+        </p:style>
+      </p:cxnSp>
+      <p:sp>
+        <p:nvSpPr>
+          <p:cNvPr id="44" name="Flowchart: Magnetic Disk 43"/>
+          <p:cNvSpPr/>
+          <p:nvPr/>
+        </p:nvSpPr>
+        <p:spPr>
+          <a:xfrm>
+            <a:off x="2305050" y="4823744"/>
+            <a:ext cx="1047750" cy="728246"/>
+          </a:xfrm>
+          <a:prstGeom prst="flowChartMagneticDisk">
+            <a:avLst/>
+          </a:prstGeom>
+          <a:solidFill>
+            <a:schemeClr val="accent3"/>
+          </a:solidFill>
+        </p:spPr>
+        <p:style>
+          <a:lnRef idx="2">
+            <a:schemeClr val="accent1">
+              <a:shade val="50000"/>
+            </a:schemeClr>
+          </a:lnRef>
+          <a:fillRef idx="1">
+            <a:schemeClr val="accent1"/>
+          </a:fillRef>
+          <a:effectRef idx="0">
+            <a:schemeClr val="accent1"/>
+          </a:effectRef>
+          <a:fontRef idx="minor">
+            <a:schemeClr val="lt1"/>
+          </a:fontRef>
+        </p:style>
+        <p:txBody>
+          <a:bodyPr rtlCol="0" anchor="ctr"/>
+          <a:lstStyle/>
+          <a:p>
+            <a:pPr algn="ctr"/>
+            <a:r>
+              <a:rPr lang="en-US" sz="1200" dirty="0" smtClean="0"/>
+              <a:t>Transform Library</a:t>
+            </a:r>
+            <a:endParaRPr lang="en-US" sz="1200" dirty="0"/>
+          </a:p>
+        </p:txBody>
+      </p:sp>
+      <p:cxnSp>
+        <p:nvCxnSpPr>
+          <p:cNvPr id="46" name="Elbow Connector 45"/>
+          <p:cNvCxnSpPr>
+            <a:stCxn id="6" idx="2"/>
+            <a:endCxn id="44" idx="1"/>
+          </p:cNvCxnSpPr>
+          <p:nvPr/>
+        </p:nvCxnSpPr>
+        <p:spPr>
+          <a:xfrm rot="16200000" flipH="1">
+            <a:off x="2583990" y="4578809"/>
+            <a:ext cx="404144" cy="85725"/>
+          </a:xfrm>
+          <a:prstGeom prst="bentConnector3">
+            <a:avLst/>
+          </a:prstGeom>
+          <a:ln w="38100">
+            <a:solidFill>
+              <a:schemeClr val="tx1"/>
+            </a:solidFill>
+            <a:headEnd type="triangle" w="med" len="med"/>
+            <a:tailEnd type="triangle" w="med" len="med"/>
+          </a:ln>
+        </p:spPr>
+        <p:style>
+          <a:lnRef idx="1">
+            <a:schemeClr val="accent1"/>
+          </a:lnRef>
+          <a:fillRef idx="0">
+            <a:schemeClr val="accent1"/>
+          </a:fillRef>
+          <a:effectRef idx="0">
+            <a:schemeClr val="accent1"/>
+          </a:effectRef>
+          <a:fontRef idx="minor">
+            <a:schemeClr val="tx1"/>
+          </a:fontRef>
+        </p:style>
+      </p:cxnSp>
+      <p:sp>
+        <p:nvSpPr>
+          <p:cNvPr id="49" name="Flowchart: Magnetic Disk 48"/>
+          <p:cNvSpPr/>
+          <p:nvPr/>
+        </p:nvSpPr>
+        <p:spPr>
+          <a:xfrm>
+            <a:off x="5810250" y="4834354"/>
+            <a:ext cx="1047750" cy="728246"/>
+          </a:xfrm>
+          <a:prstGeom prst="flowChartMagneticDisk">
+            <a:avLst/>
+          </a:prstGeom>
+          <a:solidFill>
+            <a:schemeClr val="accent3"/>
+          </a:solidFill>
+        </p:spPr>
+        <p:style>
+          <a:lnRef idx="2">
+            <a:schemeClr val="accent1">
+              <a:shade val="50000"/>
+            </a:schemeClr>
+          </a:lnRef>
+          <a:fillRef idx="1">
+            <a:schemeClr val="accent1"/>
+          </a:fillRef>
+          <a:effectRef idx="0">
+            <a:schemeClr val="accent1"/>
+          </a:effectRef>
+          <a:fontRef idx="minor">
+            <a:schemeClr val="lt1"/>
+          </a:fontRef>
+        </p:style>
+        <p:txBody>
+          <a:bodyPr rtlCol="0" anchor="ctr"/>
+          <a:lstStyle/>
+          <a:p>
+            <a:pPr algn="ctr"/>
+            <a:r>
+              <a:rPr lang="en-US" sz="1200" dirty="0" smtClean="0"/>
+              <a:t>Transform Library</a:t>
+            </a:r>
+            <a:endParaRPr lang="en-US" sz="1200" dirty="0"/>
+          </a:p>
+        </p:txBody>
+      </p:sp>
+      <p:cxnSp>
+        <p:nvCxnSpPr>
+          <p:cNvPr id="50" name="Elbow Connector 49"/>
+          <p:cNvCxnSpPr>
+            <a:stCxn id="9" idx="2"/>
+            <a:endCxn id="49" idx="1"/>
+          </p:cNvCxnSpPr>
+          <p:nvPr/>
+        </p:nvCxnSpPr>
+        <p:spPr>
+          <a:xfrm rot="16200000" flipH="1">
+            <a:off x="6100762" y="4600991"/>
+            <a:ext cx="381000" cy="85725"/>
+          </a:xfrm>
+          <a:prstGeom prst="bentConnector3">
+            <a:avLst/>
+          </a:prstGeom>
+          <a:ln w="38100">
+            <a:solidFill>
+              <a:schemeClr val="tx1"/>
+            </a:solidFill>
+            <a:headEnd type="triangle" w="med" len="med"/>
+            <a:tailEnd type="triangle" w="med" len="med"/>
+          </a:ln>
+        </p:spPr>
+        <p:style>
+          <a:lnRef idx="1">
+            <a:schemeClr val="accent1"/>
+          </a:lnRef>
+          <a:fillRef idx="0">
+            <a:schemeClr val="accent1"/>
+          </a:fillRef>
+          <a:effectRef idx="0">
+            <a:schemeClr val="accent1"/>
+          </a:effectRef>
+          <a:fontRef idx="minor">
+            <a:schemeClr val="tx1"/>
+          </a:fontRef>
+        </p:style>
+      </p:cxnSp>
     </p:spTree>
     <p:extLst>
       <p:ext uri="{BB962C8B-B14F-4D97-AF65-F5344CB8AC3E}">
@@ -10297,6 +10641,65 @@
           </a:fontRef>
         </p:style>
       </p:cxnSp>
+      <p:sp>
+        <p:nvSpPr>
+          <p:cNvPr id="9" name="Rounded Rectangular Callout 8"/>
+          <p:cNvSpPr/>
+          <p:nvPr/>
+        </p:nvSpPr>
+        <p:spPr>
+          <a:xfrm>
+            <a:off x="7239000" y="609600"/>
+            <a:ext cx="1219200" cy="685800"/>
+          </a:xfrm>
+          <a:prstGeom prst="wedgeRoundRectCallout">
+            <a:avLst>
+              <a:gd name="adj1" fmla="val -49314"/>
+              <a:gd name="adj2" fmla="val 145200"/>
+              <a:gd name="adj3" fmla="val 16667"/>
+            </a:avLst>
+          </a:prstGeom>
+          <a:solidFill>
+            <a:srgbClr val="FFFF00"/>
+          </a:solidFill>
+        </p:spPr>
+        <p:style>
+          <a:lnRef idx="2">
+            <a:schemeClr val="accent1">
+              <a:shade val="50000"/>
+            </a:schemeClr>
+          </a:lnRef>
+          <a:fillRef idx="1">
+            <a:schemeClr val="accent1"/>
+          </a:fillRef>
+          <a:effectRef idx="0">
+            <a:schemeClr val="accent1"/>
+          </a:effectRef>
+          <a:fontRef idx="minor">
+            <a:schemeClr val="lt1"/>
+          </a:fontRef>
+        </p:style>
+        <p:txBody>
+          <a:bodyPr rtlCol="0" anchor="ctr"/>
+          <a:lstStyle/>
+          <a:p>
+            <a:pPr algn="ctr"/>
+            <a:r>
+              <a:rPr lang="en-US" sz="1200" dirty="0" smtClean="0">
+                <a:solidFill>
+                  <a:schemeClr val="tx1"/>
+                </a:solidFill>
+              </a:rPr>
+              <a:t>Transfer Procedure</a:t>
+            </a:r>
+            <a:endParaRPr lang="en-US" sz="1200" dirty="0">
+              <a:solidFill>
+                <a:schemeClr val="tx1"/>
+              </a:solidFill>
+            </a:endParaRPr>
+          </a:p>
+        </p:txBody>
+      </p:sp>
     </p:spTree>
     <p:extLst>
       <p:ext uri="{BB962C8B-B14F-4D97-AF65-F5344CB8AC3E}">

</xml_diff>

<commit_message>
Updated to include feedback from P1687.1 20210803 meeting.
</commit_message>
<xml_diff>
--- a/docs/MJBUnification20210720.pptx
+++ b/docs/MJBUnification20210720.pptx
@@ -5359,7 +5359,22 @@
                   <a:schemeClr val="tx1"/>
                 </a:solidFill>
               </a:rPr>
-              <a:t>Transform Library</a:t>
+              <a:t>Transfer</a:t>
+            </a:r>
+            <a:br>
+              <a:rPr lang="en-US" sz="1200" dirty="0" smtClean="0">
+                <a:solidFill>
+                  <a:schemeClr val="tx1"/>
+                </a:solidFill>
+              </a:rPr>
+            </a:br>
+            <a:r>
+              <a:rPr lang="en-US" sz="1200" dirty="0" smtClean="0">
+                <a:solidFill>
+                  <a:schemeClr val="tx1"/>
+                </a:solidFill>
+              </a:rPr>
+              <a:t>Library</a:t>
             </a:r>
             <a:endParaRPr lang="en-US" sz="1200" dirty="0">
               <a:solidFill>
@@ -5454,7 +5469,22 @@
                   <a:schemeClr val="tx1"/>
                 </a:solidFill>
               </a:rPr>
-              <a:t>Transform Library</a:t>
+              <a:t>Transfer</a:t>
+            </a:r>
+            <a:br>
+              <a:rPr lang="en-US" sz="1200" dirty="0" smtClean="0">
+                <a:solidFill>
+                  <a:schemeClr val="tx1"/>
+                </a:solidFill>
+              </a:rPr>
+            </a:br>
+            <a:r>
+              <a:rPr lang="en-US" sz="1200" dirty="0" smtClean="0">
+                <a:solidFill>
+                  <a:schemeClr val="tx1"/>
+                </a:solidFill>
+              </a:rPr>
+              <a:t>Library</a:t>
             </a:r>
             <a:endParaRPr lang="en-US" sz="1200" dirty="0">
               <a:solidFill>
@@ -5610,11 +5640,7 @@
             </a:pPr>
             <a:r>
               <a:rPr lang="en-US" sz="4400" dirty="0" smtClean="0"/>
-              <a:t>Top-Down to Bottom-Up </a:t>
-            </a:r>
-            <a:r>
-              <a:rPr lang="en-US" sz="4400" dirty="0" smtClean="0"/>
-              <a:t>Flow</a:t>
+              <a:t>Top-Down to Bottom-Up Flow</a:t>
             </a:r>
             <a:br>
               <a:rPr lang="en-US" sz="4400" dirty="0" smtClean="0"/>
@@ -7165,11 +7191,7 @@
           <a:p>
             <a:r>
               <a:rPr lang="en-US" dirty="0" smtClean="0"/>
-              <a:t>20210803 </a:t>
-            </a:r>
-            <a:r>
-              <a:rPr lang="en-US" dirty="0" smtClean="0"/>
-              <a:t>Content</a:t>
+              <a:t>20210803 Content</a:t>
             </a:r>
             <a:endParaRPr lang="en-US" dirty="0"/>
           </a:p>
@@ -8721,7 +8743,22 @@
                   <a:schemeClr val="tx1"/>
                 </a:solidFill>
               </a:rPr>
-              <a:t>Transform Library</a:t>
+              <a:t>Transfer</a:t>
+            </a:r>
+            <a:br>
+              <a:rPr lang="en-US" dirty="0" smtClean="0">
+                <a:solidFill>
+                  <a:schemeClr val="tx1"/>
+                </a:solidFill>
+              </a:rPr>
+            </a:br>
+            <a:r>
+              <a:rPr lang="en-US" dirty="0" smtClean="0">
+                <a:solidFill>
+                  <a:schemeClr val="tx1"/>
+                </a:solidFill>
+              </a:rPr>
+              <a:t>Library</a:t>
             </a:r>
             <a:endParaRPr lang="en-US" dirty="0">
               <a:solidFill>
@@ -12751,7 +12788,11 @@
             <a:pPr algn="ctr"/>
             <a:r>
               <a:rPr lang="en-US" dirty="0" smtClean="0"/>
-              <a:t>Transfer Module</a:t>
+              <a:t>Transfer </a:t>
+            </a:r>
+            <a:r>
+              <a:rPr lang="en-US" dirty="0" smtClean="0"/>
+              <a:t>Library</a:t>
             </a:r>
             <a:endParaRPr lang="en-US" dirty="0"/>
           </a:p>
@@ -12934,7 +12975,11 @@
             <a:pPr algn="ctr"/>
             <a:r>
               <a:rPr lang="en-US" dirty="0" smtClean="0"/>
-              <a:t>Transfer Module</a:t>
+              <a:t>Transfer </a:t>
+            </a:r>
+            <a:r>
+              <a:rPr lang="en-US" dirty="0" smtClean="0"/>
+              <a:t>Library</a:t>
             </a:r>
             <a:endParaRPr lang="en-US" dirty="0"/>
           </a:p>
@@ -14265,7 +14310,11 @@
             <a:pPr algn="ctr"/>
             <a:r>
               <a:rPr lang="en-US" dirty="0" smtClean="0"/>
-              <a:t>Inject Module</a:t>
+              <a:t>Inject </a:t>
+            </a:r>
+            <a:r>
+              <a:rPr lang="en-US" dirty="0" smtClean="0"/>
+              <a:t>Library</a:t>
             </a:r>
             <a:endParaRPr lang="en-US" dirty="0"/>
           </a:p>
@@ -14448,7 +14497,11 @@
             <a:pPr algn="ctr"/>
             <a:r>
               <a:rPr lang="en-US" dirty="0" smtClean="0"/>
-              <a:t>Inject Module</a:t>
+              <a:t>Inject </a:t>
+            </a:r>
+            <a:r>
+              <a:rPr lang="en-US" dirty="0" smtClean="0"/>
+              <a:t>Library</a:t>
             </a:r>
             <a:endParaRPr lang="en-US" dirty="0"/>
           </a:p>
@@ -14908,7 +14961,11 @@
           <a:p>
             <a:r>
               <a:rPr lang="en-US" dirty="0" smtClean="0"/>
-              <a:t>Transfer Module</a:t>
+              <a:t>Transfer </a:t>
+            </a:r>
+            <a:r>
+              <a:rPr lang="en-US" dirty="0" smtClean="0"/>
+              <a:t>Library Logic</a:t>
             </a:r>
             <a:endParaRPr lang="en-US" dirty="0"/>
           </a:p>
@@ -14992,7 +15049,11 @@
             <a:pPr algn="ctr"/>
             <a:r>
               <a:rPr lang="en-US" dirty="0" smtClean="0"/>
-              <a:t>Transfer Module </a:t>
+              <a:t>Transfer </a:t>
+            </a:r>
+            <a:r>
+              <a:rPr lang="en-US" dirty="0" smtClean="0"/>
+              <a:t>Library </a:t>
             </a:r>
             <a:r>
               <a:rPr lang="en-US" dirty="0" err="1" smtClean="0"/>
@@ -15088,7 +15149,7 @@
             <a:pPr algn="ctr"/>
             <a:r>
               <a:rPr lang="en-US" dirty="0" smtClean="0"/>
-              <a:t>Message1 Handler</a:t>
+              <a:t>MessageType1 Transfer Procedure</a:t>
             </a:r>
             <a:endParaRPr lang="en-US" dirty="0"/>
           </a:p>
@@ -15132,7 +15193,11 @@
             <a:pPr algn="ctr"/>
             <a:r>
               <a:rPr lang="en-US" dirty="0" smtClean="0"/>
-              <a:t>Message2 Handler</a:t>
+              <a:t>MessageType2 </a:t>
+            </a:r>
+            <a:r>
+              <a:rPr lang="en-US" dirty="0"/>
+              <a:t>Transfer Procedure</a:t>
             </a:r>
             <a:endParaRPr lang="en-US" dirty="0"/>
           </a:p>
@@ -15176,7 +15241,11 @@
             <a:pPr algn="ctr"/>
             <a:r>
               <a:rPr lang="en-US" dirty="0" smtClean="0"/>
-              <a:t>Message3 Handler</a:t>
+              <a:t>MessageType3 </a:t>
+            </a:r>
+            <a:r>
+              <a:rPr lang="en-US" dirty="0"/>
+              <a:t>Transfer Procedure</a:t>
             </a:r>
             <a:endParaRPr lang="en-US" dirty="0"/>
           </a:p>
@@ -15389,7 +15458,7 @@
         </p:nvSpPr>
         <p:spPr>
           <a:xfrm>
-            <a:off x="7239000" y="609600"/>
+            <a:off x="7772400" y="685800"/>
             <a:ext cx="1219200" cy="685800"/>
           </a:xfrm>
           <a:prstGeom prst="wedgeRoundRectCallout">

</xml_diff>